<commit_message>
complete Tips for different tasks
</commit_message>
<xml_diff>
--- a/docs/Presentation1.pptx
+++ b/docs/Presentation1.pptx
@@ -7,6 +7,7 @@
   <p:sldIdLst>
     <p:sldId id="256" r:id="rId2"/>
     <p:sldId id="257" r:id="rId3"/>
+    <p:sldId id="258" r:id="rId4"/>
   </p:sldIdLst>
   <p:sldSz cx="12192000" cy="6858000"/>
   <p:notesSz cx="6858000" cy="9144000"/>
@@ -262,7 +263,7 @@
           <a:p>
             <a:fld id="{1101AFE0-668C-6E4E-9733-25BD1AF099FC}" type="datetimeFigureOut">
               <a:rPr lang="en-CN" smtClean="0"/>
-              <a:t>2023/9/7</a:t>
+              <a:t>2024/1/10</a:t>
             </a:fld>
             <a:endParaRPr lang="en-CN"/>
           </a:p>
@@ -462,7 +463,7 @@
           <a:p>
             <a:fld id="{1101AFE0-668C-6E4E-9733-25BD1AF099FC}" type="datetimeFigureOut">
               <a:rPr lang="en-CN" smtClean="0"/>
-              <a:t>2023/9/7</a:t>
+              <a:t>2024/1/10</a:t>
             </a:fld>
             <a:endParaRPr lang="en-CN"/>
           </a:p>
@@ -672,7 +673,7 @@
           <a:p>
             <a:fld id="{1101AFE0-668C-6E4E-9733-25BD1AF099FC}" type="datetimeFigureOut">
               <a:rPr lang="en-CN" smtClean="0"/>
-              <a:t>2023/9/7</a:t>
+              <a:t>2024/1/10</a:t>
             </a:fld>
             <a:endParaRPr lang="en-CN"/>
           </a:p>
@@ -872,7 +873,7 @@
           <a:p>
             <a:fld id="{1101AFE0-668C-6E4E-9733-25BD1AF099FC}" type="datetimeFigureOut">
               <a:rPr lang="en-CN" smtClean="0"/>
-              <a:t>2023/9/7</a:t>
+              <a:t>2024/1/10</a:t>
             </a:fld>
             <a:endParaRPr lang="en-CN"/>
           </a:p>
@@ -1148,7 +1149,7 @@
           <a:p>
             <a:fld id="{1101AFE0-668C-6E4E-9733-25BD1AF099FC}" type="datetimeFigureOut">
               <a:rPr lang="en-CN" smtClean="0"/>
-              <a:t>2023/9/7</a:t>
+              <a:t>2024/1/10</a:t>
             </a:fld>
             <a:endParaRPr lang="en-CN"/>
           </a:p>
@@ -1416,7 +1417,7 @@
           <a:p>
             <a:fld id="{1101AFE0-668C-6E4E-9733-25BD1AF099FC}" type="datetimeFigureOut">
               <a:rPr lang="en-CN" smtClean="0"/>
-              <a:t>2023/9/7</a:t>
+              <a:t>2024/1/10</a:t>
             </a:fld>
             <a:endParaRPr lang="en-CN"/>
           </a:p>
@@ -1831,7 +1832,7 @@
           <a:p>
             <a:fld id="{1101AFE0-668C-6E4E-9733-25BD1AF099FC}" type="datetimeFigureOut">
               <a:rPr lang="en-CN" smtClean="0"/>
-              <a:t>2023/9/7</a:t>
+              <a:t>2024/1/10</a:t>
             </a:fld>
             <a:endParaRPr lang="en-CN"/>
           </a:p>
@@ -1973,7 +1974,7 @@
           <a:p>
             <a:fld id="{1101AFE0-668C-6E4E-9733-25BD1AF099FC}" type="datetimeFigureOut">
               <a:rPr lang="en-CN" smtClean="0"/>
-              <a:t>2023/9/7</a:t>
+              <a:t>2024/1/10</a:t>
             </a:fld>
             <a:endParaRPr lang="en-CN"/>
           </a:p>
@@ -2086,7 +2087,7 @@
           <a:p>
             <a:fld id="{1101AFE0-668C-6E4E-9733-25BD1AF099FC}" type="datetimeFigureOut">
               <a:rPr lang="en-CN" smtClean="0"/>
-              <a:t>2023/9/7</a:t>
+              <a:t>2024/1/10</a:t>
             </a:fld>
             <a:endParaRPr lang="en-CN"/>
           </a:p>
@@ -2399,7 +2400,7 @@
           <a:p>
             <a:fld id="{1101AFE0-668C-6E4E-9733-25BD1AF099FC}" type="datetimeFigureOut">
               <a:rPr lang="en-CN" smtClean="0"/>
-              <a:t>2023/9/7</a:t>
+              <a:t>2024/1/10</a:t>
             </a:fld>
             <a:endParaRPr lang="en-CN"/>
           </a:p>
@@ -2688,7 +2689,7 @@
           <a:p>
             <a:fld id="{1101AFE0-668C-6E4E-9733-25BD1AF099FC}" type="datetimeFigureOut">
               <a:rPr lang="en-CN" smtClean="0"/>
-              <a:t>2023/9/7</a:t>
+              <a:t>2024/1/10</a:t>
             </a:fld>
             <a:endParaRPr lang="en-CN"/>
           </a:p>
@@ -2931,7 +2932,7 @@
           <a:p>
             <a:fld id="{1101AFE0-668C-6E4E-9733-25BD1AF099FC}" type="datetimeFigureOut">
               <a:rPr lang="en-CN" smtClean="0"/>
-              <a:t>2023/9/7</a:t>
+              <a:t>2024/1/10</a:t>
             </a:fld>
             <a:endParaRPr lang="en-CN"/>
           </a:p>
@@ -4817,6 +4818,1704 @@
 </p:sld>
 </file>
 
+<file path=ppt/slides/slide3.xml><?xml version="1.0" encoding="utf-8"?>
+<p:sld xmlns:a="http://schemas.openxmlformats.org/drawingml/2006/main" xmlns:r="http://schemas.openxmlformats.org/officeDocument/2006/relationships" xmlns:p="http://schemas.openxmlformats.org/presentationml/2006/main">
+  <p:cSld>
+    <p:spTree>
+      <p:nvGrpSpPr>
+        <p:cNvPr id="1" name=""/>
+        <p:cNvGrpSpPr/>
+        <p:nvPr/>
+      </p:nvGrpSpPr>
+      <p:grpSpPr>
+        <a:xfrm>
+          <a:off x="0" y="0"/>
+          <a:ext cx="0" cy="0"/>
+          <a:chOff x="0" y="0"/>
+          <a:chExt cx="0" cy="0"/>
+        </a:xfrm>
+      </p:grpSpPr>
+      <p:sp>
+        <p:nvSpPr>
+          <p:cNvPr id="4" name="TextBox 3">
+            <a:extLst>
+              <a:ext uri="{FF2B5EF4-FFF2-40B4-BE49-F238E27FC236}">
+                <a16:creationId xmlns:a16="http://schemas.microsoft.com/office/drawing/2014/main" id="{7DB549D0-2EC3-9446-9033-A5EB2ACD4303}"/>
+              </a:ext>
+            </a:extLst>
+          </p:cNvPr>
+          <p:cNvSpPr txBox="1"/>
+          <p:nvPr/>
+        </p:nvSpPr>
+        <p:spPr>
+          <a:xfrm>
+            <a:off x="2255386" y="361388"/>
+            <a:ext cx="4102405" cy="369332"/>
+          </a:xfrm>
+          <a:prstGeom prst="rect">
+            <a:avLst/>
+          </a:prstGeom>
+          <a:noFill/>
+        </p:spPr>
+        <p:txBody>
+          <a:bodyPr wrap="none" rtlCol="0">
+            <a:spAutoFit/>
+          </a:bodyPr>
+          <a:lstStyle/>
+          <a:p>
+            <a:r>
+              <a:rPr lang="en-CN" dirty="0"/>
+              <a:t>X=[1,4,2,74,1,66,42,8,6,34,55,774,22,4,…]</a:t>
+            </a:r>
+          </a:p>
+        </p:txBody>
+      </p:sp>
+      <p:sp>
+        <p:nvSpPr>
+          <p:cNvPr id="5" name="TextBox 4">
+            <a:extLst>
+              <a:ext uri="{FF2B5EF4-FFF2-40B4-BE49-F238E27FC236}">
+                <a16:creationId xmlns:a16="http://schemas.microsoft.com/office/drawing/2014/main" id="{363A6976-D312-DF0F-192B-CD88662E0C43}"/>
+              </a:ext>
+            </a:extLst>
+          </p:cNvPr>
+          <p:cNvSpPr txBox="1"/>
+          <p:nvPr/>
+        </p:nvSpPr>
+        <p:spPr>
+          <a:xfrm>
+            <a:off x="2255386" y="785804"/>
+            <a:ext cx="3392275" cy="369332"/>
+          </a:xfrm>
+          <a:prstGeom prst="rect">
+            <a:avLst/>
+          </a:prstGeom>
+          <a:noFill/>
+        </p:spPr>
+        <p:txBody>
+          <a:bodyPr wrap="none" rtlCol="0">
+            <a:spAutoFit/>
+          </a:bodyPr>
+          <a:lstStyle/>
+          <a:p>
+            <a:r>
+              <a:rPr lang="en-CN" dirty="0"/>
+              <a:t>Y=[</a:t>
+            </a:r>
+            <a:r>
+              <a:rPr lang="en-CN" dirty="0">
+                <a:solidFill>
+                  <a:schemeClr val="accent6"/>
+                </a:solidFill>
+              </a:rPr>
+              <a:t>0,0,0,0,0,0,0,0,0</a:t>
+            </a:r>
+            <a:r>
+              <a:rPr lang="en-CN" dirty="0"/>
+              <a:t>,</a:t>
+            </a:r>
+            <a:r>
+              <a:rPr lang="en-CN" dirty="0">
+                <a:solidFill>
+                  <a:schemeClr val="accent2"/>
+                </a:solidFill>
+              </a:rPr>
+              <a:t>3,5,2,10,20</a:t>
+            </a:r>
+            <a:r>
+              <a:rPr lang="en-CN" dirty="0"/>
+              <a:t>,…]</a:t>
+            </a:r>
+          </a:p>
+        </p:txBody>
+      </p:sp>
+      <p:cxnSp>
+        <p:nvCxnSpPr>
+          <p:cNvPr id="6" name="Straight Arrow Connector 5">
+            <a:extLst>
+              <a:ext uri="{FF2B5EF4-FFF2-40B4-BE49-F238E27FC236}">
+                <a16:creationId xmlns:a16="http://schemas.microsoft.com/office/drawing/2014/main" id="{86B31FDA-CBBF-F6CC-32CA-DA0B3B43A375}"/>
+              </a:ext>
+            </a:extLst>
+          </p:cNvPr>
+          <p:cNvCxnSpPr>
+            <a:cxnSpLocks/>
+          </p:cNvCxnSpPr>
+          <p:nvPr/>
+        </p:nvCxnSpPr>
+        <p:spPr>
+          <a:xfrm>
+            <a:off x="7676678" y="1735856"/>
+            <a:ext cx="2208844" cy="0"/>
+          </a:xfrm>
+          <a:prstGeom prst="straightConnector1">
+            <a:avLst/>
+          </a:prstGeom>
+          <a:ln w="31750">
+            <a:tailEnd type="triangle"/>
+          </a:ln>
+        </p:spPr>
+        <p:style>
+          <a:lnRef idx="1">
+            <a:schemeClr val="accent1"/>
+          </a:lnRef>
+          <a:fillRef idx="0">
+            <a:schemeClr val="accent1"/>
+          </a:fillRef>
+          <a:effectRef idx="0">
+            <a:schemeClr val="accent1"/>
+          </a:effectRef>
+          <a:fontRef idx="minor">
+            <a:schemeClr val="tx1"/>
+          </a:fontRef>
+        </p:style>
+      </p:cxnSp>
+      <p:cxnSp>
+        <p:nvCxnSpPr>
+          <p:cNvPr id="7" name="Straight Arrow Connector 6">
+            <a:extLst>
+              <a:ext uri="{FF2B5EF4-FFF2-40B4-BE49-F238E27FC236}">
+                <a16:creationId xmlns:a16="http://schemas.microsoft.com/office/drawing/2014/main" id="{0DF8E7A9-812D-4B98-67FC-C585FCE7F0A4}"/>
+              </a:ext>
+            </a:extLst>
+          </p:cNvPr>
+          <p:cNvCxnSpPr>
+            <a:cxnSpLocks/>
+          </p:cNvCxnSpPr>
+          <p:nvPr/>
+        </p:nvCxnSpPr>
+        <p:spPr>
+          <a:xfrm flipV="1">
+            <a:off x="7829078" y="424815"/>
+            <a:ext cx="0" cy="1458693"/>
+          </a:xfrm>
+          <a:prstGeom prst="straightConnector1">
+            <a:avLst/>
+          </a:prstGeom>
+          <a:ln w="31750">
+            <a:tailEnd type="triangle"/>
+          </a:ln>
+        </p:spPr>
+        <p:style>
+          <a:lnRef idx="1">
+            <a:schemeClr val="accent1"/>
+          </a:lnRef>
+          <a:fillRef idx="0">
+            <a:schemeClr val="accent1"/>
+          </a:fillRef>
+          <a:effectRef idx="0">
+            <a:schemeClr val="accent1"/>
+          </a:effectRef>
+          <a:fontRef idx="minor">
+            <a:schemeClr val="tx1"/>
+          </a:fontRef>
+        </p:style>
+      </p:cxnSp>
+      <p:sp>
+        <p:nvSpPr>
+          <p:cNvPr id="8" name="Freeform 7">
+            <a:extLst>
+              <a:ext uri="{FF2B5EF4-FFF2-40B4-BE49-F238E27FC236}">
+                <a16:creationId xmlns:a16="http://schemas.microsoft.com/office/drawing/2014/main" id="{D0D03AC2-C203-52CD-4C0A-CFE3CDDB8941}"/>
+              </a:ext>
+            </a:extLst>
+          </p:cNvPr>
+          <p:cNvSpPr/>
+          <p:nvPr/>
+        </p:nvSpPr>
+        <p:spPr>
+          <a:xfrm>
+            <a:off x="7841931" y="517891"/>
+            <a:ext cx="1674564" cy="1183077"/>
+          </a:xfrm>
+          <a:custGeom>
+            <a:avLst/>
+            <a:gdLst>
+              <a:gd name="connsiteX0" fmla="*/ 0 w 1674564"/>
+              <a:gd name="connsiteY0" fmla="*/ 127262 h 1779792"/>
+              <a:gd name="connsiteX1" fmla="*/ 55084 w 1674564"/>
+              <a:gd name="connsiteY1" fmla="*/ 138279 h 1779792"/>
+              <a:gd name="connsiteX2" fmla="*/ 132203 w 1674564"/>
+              <a:gd name="connsiteY2" fmla="*/ 1537421 h 1779792"/>
+              <a:gd name="connsiteX3" fmla="*/ 605928 w 1674564"/>
+              <a:gd name="connsiteY3" fmla="*/ 1504370 h 1779792"/>
+              <a:gd name="connsiteX4" fmla="*/ 969484 w 1674564"/>
+              <a:gd name="connsiteY4" fmla="*/ 1537421 h 1779792"/>
+              <a:gd name="connsiteX5" fmla="*/ 1244906 w 1674564"/>
+              <a:gd name="connsiteY5" fmla="*/ 1427252 h 1779792"/>
+              <a:gd name="connsiteX6" fmla="*/ 1597446 w 1674564"/>
+              <a:gd name="connsiteY6" fmla="*/ 1658606 h 1779792"/>
+              <a:gd name="connsiteX7" fmla="*/ 1674564 w 1674564"/>
+              <a:gd name="connsiteY7" fmla="*/ 1779792 h 1779792"/>
+            </a:gdLst>
+            <a:ahLst/>
+            <a:cxnLst>
+              <a:cxn ang="0">
+                <a:pos x="connsiteX0" y="connsiteY0"/>
+              </a:cxn>
+              <a:cxn ang="0">
+                <a:pos x="connsiteX1" y="connsiteY1"/>
+              </a:cxn>
+              <a:cxn ang="0">
+                <a:pos x="connsiteX2" y="connsiteY2"/>
+              </a:cxn>
+              <a:cxn ang="0">
+                <a:pos x="connsiteX3" y="connsiteY3"/>
+              </a:cxn>
+              <a:cxn ang="0">
+                <a:pos x="connsiteX4" y="connsiteY4"/>
+              </a:cxn>
+              <a:cxn ang="0">
+                <a:pos x="connsiteX5" y="connsiteY5"/>
+              </a:cxn>
+              <a:cxn ang="0">
+                <a:pos x="connsiteX6" y="connsiteY6"/>
+              </a:cxn>
+              <a:cxn ang="0">
+                <a:pos x="connsiteX7" y="connsiteY7"/>
+              </a:cxn>
+            </a:cxnLst>
+            <a:rect l="l" t="t" r="r" b="b"/>
+            <a:pathLst>
+              <a:path w="1674564" h="1779792">
+                <a:moveTo>
+                  <a:pt x="0" y="127262"/>
+                </a:moveTo>
+                <a:cubicBezTo>
+                  <a:pt x="16525" y="15257"/>
+                  <a:pt x="33050" y="-96747"/>
+                  <a:pt x="55084" y="138279"/>
+                </a:cubicBezTo>
+                <a:cubicBezTo>
+                  <a:pt x="77118" y="373305"/>
+                  <a:pt x="40396" y="1309739"/>
+                  <a:pt x="132203" y="1537421"/>
+                </a:cubicBezTo>
+                <a:cubicBezTo>
+                  <a:pt x="224010" y="1765103"/>
+                  <a:pt x="466381" y="1504370"/>
+                  <a:pt x="605928" y="1504370"/>
+                </a:cubicBezTo>
+                <a:cubicBezTo>
+                  <a:pt x="745475" y="1504370"/>
+                  <a:pt x="862988" y="1550274"/>
+                  <a:pt x="969484" y="1537421"/>
+                </a:cubicBezTo>
+                <a:cubicBezTo>
+                  <a:pt x="1075980" y="1524568"/>
+                  <a:pt x="1140246" y="1407055"/>
+                  <a:pt x="1244906" y="1427252"/>
+                </a:cubicBezTo>
+                <a:cubicBezTo>
+                  <a:pt x="1349566" y="1447449"/>
+                  <a:pt x="1525836" y="1599849"/>
+                  <a:pt x="1597446" y="1658606"/>
+                </a:cubicBezTo>
+                <a:cubicBezTo>
+                  <a:pt x="1669056" y="1717363"/>
+                  <a:pt x="1671810" y="1748577"/>
+                  <a:pt x="1674564" y="1779792"/>
+                </a:cubicBezTo>
+              </a:path>
+            </a:pathLst>
+          </a:custGeom>
+          <a:noFill/>
+          <a:ln w="34925"/>
+        </p:spPr>
+        <p:style>
+          <a:lnRef idx="2">
+            <a:schemeClr val="accent1">
+              <a:shade val="50000"/>
+            </a:schemeClr>
+          </a:lnRef>
+          <a:fillRef idx="1">
+            <a:schemeClr val="accent1"/>
+          </a:fillRef>
+          <a:effectRef idx="0">
+            <a:schemeClr val="accent1"/>
+          </a:effectRef>
+          <a:fontRef idx="minor">
+            <a:schemeClr val="lt1"/>
+          </a:fontRef>
+        </p:style>
+        <p:txBody>
+          <a:bodyPr rtlCol="0" anchor="ctr"/>
+          <a:lstStyle/>
+          <a:p>
+            <a:pPr algn="ctr"/>
+            <a:endParaRPr lang="en-CN" dirty="0"/>
+          </a:p>
+        </p:txBody>
+      </p:sp>
+      <p:sp>
+        <p:nvSpPr>
+          <p:cNvPr id="9" name="TextBox 8">
+            <a:extLst>
+              <a:ext uri="{FF2B5EF4-FFF2-40B4-BE49-F238E27FC236}">
+                <a16:creationId xmlns:a16="http://schemas.microsoft.com/office/drawing/2014/main" id="{BC960838-D81E-C5BC-D759-EFB9F3AC3CFC}"/>
+              </a:ext>
+            </a:extLst>
+          </p:cNvPr>
+          <p:cNvSpPr txBox="1"/>
+          <p:nvPr/>
+        </p:nvSpPr>
+        <p:spPr>
+          <a:xfrm>
+            <a:off x="6710080" y="352939"/>
+            <a:ext cx="1130631" cy="369332"/>
+          </a:xfrm>
+          <a:prstGeom prst="rect">
+            <a:avLst/>
+          </a:prstGeom>
+          <a:noFill/>
+        </p:spPr>
+        <p:txBody>
+          <a:bodyPr wrap="none" rtlCol="0">
+            <a:spAutoFit/>
+          </a:bodyPr>
+          <a:lstStyle/>
+          <a:p>
+            <a:r>
+              <a:rPr lang="en-CN" dirty="0"/>
+              <a:t>frequency</a:t>
+            </a:r>
+          </a:p>
+        </p:txBody>
+      </p:sp>
+      <p:sp>
+        <p:nvSpPr>
+          <p:cNvPr id="10" name="TextBox 9">
+            <a:extLst>
+              <a:ext uri="{FF2B5EF4-FFF2-40B4-BE49-F238E27FC236}">
+                <a16:creationId xmlns:a16="http://schemas.microsoft.com/office/drawing/2014/main" id="{52322654-AD89-2E84-1879-BFB64930748E}"/>
+              </a:ext>
+            </a:extLst>
+          </p:cNvPr>
+          <p:cNvSpPr txBox="1"/>
+          <p:nvPr/>
+        </p:nvSpPr>
+        <p:spPr>
+          <a:xfrm>
+            <a:off x="7885374" y="1776847"/>
+            <a:ext cx="2113912" cy="369332"/>
+          </a:xfrm>
+          <a:prstGeom prst="rect">
+            <a:avLst/>
+          </a:prstGeom>
+          <a:noFill/>
+        </p:spPr>
+        <p:txBody>
+          <a:bodyPr wrap="none" rtlCol="0">
+            <a:spAutoFit/>
+          </a:bodyPr>
+          <a:lstStyle/>
+          <a:p>
+            <a:r>
+              <a:rPr lang="en-CN" dirty="0"/>
+              <a:t>bird individual count</a:t>
+            </a:r>
+          </a:p>
+        </p:txBody>
+      </p:sp>
+      <p:cxnSp>
+        <p:nvCxnSpPr>
+          <p:cNvPr id="11" name="Straight Arrow Connector 10">
+            <a:extLst>
+              <a:ext uri="{FF2B5EF4-FFF2-40B4-BE49-F238E27FC236}">
+                <a16:creationId xmlns:a16="http://schemas.microsoft.com/office/drawing/2014/main" id="{B30D13AE-E608-3424-51F8-0A11A78CC4E3}"/>
+              </a:ext>
+            </a:extLst>
+          </p:cNvPr>
+          <p:cNvCxnSpPr>
+            <a:cxnSpLocks/>
+            <a:stCxn id="5" idx="2"/>
+            <a:endCxn id="13" idx="0"/>
+          </p:cNvCxnSpPr>
+          <p:nvPr/>
+        </p:nvCxnSpPr>
+        <p:spPr>
+          <a:xfrm flipH="1">
+            <a:off x="2255387" y="1155136"/>
+            <a:ext cx="1696137" cy="943763"/>
+          </a:xfrm>
+          <a:prstGeom prst="straightConnector1">
+            <a:avLst/>
+          </a:prstGeom>
+          <a:ln w="50800">
+            <a:solidFill>
+              <a:schemeClr val="accent1"/>
+            </a:solidFill>
+            <a:tailEnd type="triangle"/>
+          </a:ln>
+        </p:spPr>
+        <p:style>
+          <a:lnRef idx="1">
+            <a:schemeClr val="accent1"/>
+          </a:lnRef>
+          <a:fillRef idx="0">
+            <a:schemeClr val="accent1"/>
+          </a:fillRef>
+          <a:effectRef idx="0">
+            <a:schemeClr val="accent1"/>
+          </a:effectRef>
+          <a:fontRef idx="minor">
+            <a:schemeClr val="tx1"/>
+          </a:fontRef>
+        </p:style>
+      </p:cxnSp>
+      <p:sp>
+        <p:nvSpPr>
+          <p:cNvPr id="12" name="TextBox 11">
+            <a:extLst>
+              <a:ext uri="{FF2B5EF4-FFF2-40B4-BE49-F238E27FC236}">
+                <a16:creationId xmlns:a16="http://schemas.microsoft.com/office/drawing/2014/main" id="{80030FAB-95B7-2D06-A33B-F41099E68119}"/>
+              </a:ext>
+            </a:extLst>
+          </p:cNvPr>
+          <p:cNvSpPr txBox="1"/>
+          <p:nvPr/>
+        </p:nvSpPr>
+        <p:spPr>
+          <a:xfrm>
+            <a:off x="705432" y="1328025"/>
+            <a:ext cx="2239844" cy="369332"/>
+          </a:xfrm>
+          <a:prstGeom prst="rect">
+            <a:avLst/>
+          </a:prstGeom>
+          <a:noFill/>
+        </p:spPr>
+        <p:txBody>
+          <a:bodyPr wrap="none" rtlCol="0">
+            <a:spAutoFit/>
+          </a:bodyPr>
+          <a:lstStyle/>
+          <a:p>
+            <a:r>
+              <a:rPr lang="en-CN" dirty="0"/>
+              <a:t>Binary transformation</a:t>
+            </a:r>
+          </a:p>
+        </p:txBody>
+      </p:sp>
+      <p:sp>
+        <p:nvSpPr>
+          <p:cNvPr id="13" name="TextBox 12">
+            <a:extLst>
+              <a:ext uri="{FF2B5EF4-FFF2-40B4-BE49-F238E27FC236}">
+                <a16:creationId xmlns:a16="http://schemas.microsoft.com/office/drawing/2014/main" id="{F33AE6A4-1201-C48F-E1E4-C11F92D85D77}"/>
+              </a:ext>
+            </a:extLst>
+          </p:cNvPr>
+          <p:cNvSpPr txBox="1"/>
+          <p:nvPr/>
+        </p:nvSpPr>
+        <p:spPr>
+          <a:xfrm>
+            <a:off x="204184" y="2098899"/>
+            <a:ext cx="4102405" cy="369332"/>
+          </a:xfrm>
+          <a:prstGeom prst="rect">
+            <a:avLst/>
+          </a:prstGeom>
+          <a:noFill/>
+        </p:spPr>
+        <p:txBody>
+          <a:bodyPr wrap="none" rtlCol="0">
+            <a:spAutoFit/>
+          </a:bodyPr>
+          <a:lstStyle/>
+          <a:p>
+            <a:r>
+              <a:rPr lang="en-CN" dirty="0"/>
+              <a:t>X=[1,4,2,74,1,66,42,8,6,34,55,774,22,4,…]</a:t>
+            </a:r>
+          </a:p>
+        </p:txBody>
+      </p:sp>
+      <p:sp>
+        <p:nvSpPr>
+          <p:cNvPr id="14" name="TextBox 13">
+            <a:extLst>
+              <a:ext uri="{FF2B5EF4-FFF2-40B4-BE49-F238E27FC236}">
+                <a16:creationId xmlns:a16="http://schemas.microsoft.com/office/drawing/2014/main" id="{7232435A-EF83-33EE-DA0D-D189CE0187D1}"/>
+              </a:ext>
+            </a:extLst>
+          </p:cNvPr>
+          <p:cNvSpPr txBox="1"/>
+          <p:nvPr/>
+        </p:nvSpPr>
+        <p:spPr>
+          <a:xfrm>
+            <a:off x="204184" y="2523315"/>
+            <a:ext cx="3158237" cy="369332"/>
+          </a:xfrm>
+          <a:prstGeom prst="rect">
+            <a:avLst/>
+          </a:prstGeom>
+          <a:noFill/>
+        </p:spPr>
+        <p:txBody>
+          <a:bodyPr wrap="none" rtlCol="0">
+            <a:spAutoFit/>
+          </a:bodyPr>
+          <a:lstStyle/>
+          <a:p>
+            <a:r>
+              <a:rPr lang="en-CN" dirty="0"/>
+              <a:t>Y=[</a:t>
+            </a:r>
+            <a:r>
+              <a:rPr lang="en-CN" dirty="0">
+                <a:solidFill>
+                  <a:schemeClr val="accent6"/>
+                </a:solidFill>
+              </a:rPr>
+              <a:t>0,0,0,0,0,0,0,0,0</a:t>
+            </a:r>
+            <a:r>
+              <a:rPr lang="en-CN" dirty="0"/>
+              <a:t>,</a:t>
+            </a:r>
+            <a:r>
+              <a:rPr lang="en-CN" dirty="0">
+                <a:solidFill>
+                  <a:schemeClr val="accent2"/>
+                </a:solidFill>
+              </a:rPr>
+              <a:t>1,1,1,1,1</a:t>
+            </a:r>
+            <a:r>
+              <a:rPr lang="en-CN" dirty="0"/>
+              <a:t>,…]</a:t>
+            </a:r>
+          </a:p>
+        </p:txBody>
+      </p:sp>
+      <p:cxnSp>
+        <p:nvCxnSpPr>
+          <p:cNvPr id="15" name="Straight Arrow Connector 14">
+            <a:extLst>
+              <a:ext uri="{FF2B5EF4-FFF2-40B4-BE49-F238E27FC236}">
+                <a16:creationId xmlns:a16="http://schemas.microsoft.com/office/drawing/2014/main" id="{320E92C9-CD53-7410-8F19-C0AC7B7ED32C}"/>
+              </a:ext>
+            </a:extLst>
+          </p:cNvPr>
+          <p:cNvCxnSpPr>
+            <a:cxnSpLocks/>
+            <a:stCxn id="14" idx="2"/>
+          </p:cNvCxnSpPr>
+          <p:nvPr/>
+        </p:nvCxnSpPr>
+        <p:spPr>
+          <a:xfrm>
+            <a:off x="1783303" y="2892647"/>
+            <a:ext cx="0" cy="1395454"/>
+          </a:xfrm>
+          <a:prstGeom prst="straightConnector1">
+            <a:avLst/>
+          </a:prstGeom>
+          <a:ln w="50800">
+            <a:solidFill>
+              <a:schemeClr val="accent1"/>
+            </a:solidFill>
+            <a:tailEnd type="triangle"/>
+          </a:ln>
+        </p:spPr>
+        <p:style>
+          <a:lnRef idx="1">
+            <a:schemeClr val="accent1"/>
+          </a:lnRef>
+          <a:fillRef idx="0">
+            <a:schemeClr val="accent1"/>
+          </a:fillRef>
+          <a:effectRef idx="0">
+            <a:schemeClr val="accent1"/>
+          </a:effectRef>
+          <a:fontRef idx="minor">
+            <a:schemeClr val="tx1"/>
+          </a:fontRef>
+        </p:style>
+      </p:cxnSp>
+      <p:sp>
+        <p:nvSpPr>
+          <p:cNvPr id="16" name="TextBox 15">
+            <a:extLst>
+              <a:ext uri="{FF2B5EF4-FFF2-40B4-BE49-F238E27FC236}">
+                <a16:creationId xmlns:a16="http://schemas.microsoft.com/office/drawing/2014/main" id="{A322741D-86D3-0680-25A0-74B6B86CC712}"/>
+              </a:ext>
+            </a:extLst>
+          </p:cNvPr>
+          <p:cNvSpPr txBox="1"/>
+          <p:nvPr/>
+        </p:nvSpPr>
+        <p:spPr>
+          <a:xfrm>
+            <a:off x="1284607" y="4314867"/>
+            <a:ext cx="997389" cy="369332"/>
+          </a:xfrm>
+          <a:prstGeom prst="rect">
+            <a:avLst/>
+          </a:prstGeom>
+          <a:noFill/>
+        </p:spPr>
+        <p:txBody>
+          <a:bodyPr wrap="none" rtlCol="0">
+            <a:spAutoFit/>
+          </a:bodyPr>
+          <a:lstStyle/>
+          <a:p>
+            <a:r>
+              <a:rPr lang="en-CN" dirty="0"/>
+              <a:t>classifier</a:t>
+            </a:r>
+          </a:p>
+        </p:txBody>
+      </p:sp>
+      <p:cxnSp>
+        <p:nvCxnSpPr>
+          <p:cNvPr id="17" name="Straight Arrow Connector 16">
+            <a:extLst>
+              <a:ext uri="{FF2B5EF4-FFF2-40B4-BE49-F238E27FC236}">
+                <a16:creationId xmlns:a16="http://schemas.microsoft.com/office/drawing/2014/main" id="{1C12A36F-AB00-1E99-89DE-097A19D7F0FA}"/>
+              </a:ext>
+            </a:extLst>
+          </p:cNvPr>
+          <p:cNvCxnSpPr>
+            <a:cxnSpLocks/>
+            <a:stCxn id="5" idx="2"/>
+            <a:endCxn id="18" idx="0"/>
+          </p:cNvCxnSpPr>
+          <p:nvPr/>
+        </p:nvCxnSpPr>
+        <p:spPr>
+          <a:xfrm>
+            <a:off x="3951524" y="1155136"/>
+            <a:ext cx="1990673" cy="943763"/>
+          </a:xfrm>
+          <a:prstGeom prst="straightConnector1">
+            <a:avLst/>
+          </a:prstGeom>
+          <a:ln w="50800">
+            <a:solidFill>
+              <a:schemeClr val="accent1"/>
+            </a:solidFill>
+            <a:tailEnd type="triangle"/>
+          </a:ln>
+        </p:spPr>
+        <p:style>
+          <a:lnRef idx="1">
+            <a:schemeClr val="accent1"/>
+          </a:lnRef>
+          <a:fillRef idx="0">
+            <a:schemeClr val="accent1"/>
+          </a:fillRef>
+          <a:effectRef idx="0">
+            <a:schemeClr val="accent1"/>
+          </a:effectRef>
+          <a:fontRef idx="minor">
+            <a:schemeClr val="tx1"/>
+          </a:fontRef>
+        </p:style>
+      </p:cxnSp>
+      <p:sp>
+        <p:nvSpPr>
+          <p:cNvPr id="18" name="TextBox 17">
+            <a:extLst>
+              <a:ext uri="{FF2B5EF4-FFF2-40B4-BE49-F238E27FC236}">
+                <a16:creationId xmlns:a16="http://schemas.microsoft.com/office/drawing/2014/main" id="{8FDCDADD-4239-1253-CA7F-1DA8C444A0F4}"/>
+              </a:ext>
+            </a:extLst>
+          </p:cNvPr>
+          <p:cNvSpPr txBox="1"/>
+          <p:nvPr/>
+        </p:nvSpPr>
+        <p:spPr>
+          <a:xfrm>
+            <a:off x="4852796" y="2098899"/>
+            <a:ext cx="2178802" cy="369332"/>
+          </a:xfrm>
+          <a:prstGeom prst="rect">
+            <a:avLst/>
+          </a:prstGeom>
+          <a:noFill/>
+        </p:spPr>
+        <p:txBody>
+          <a:bodyPr wrap="none" rtlCol="0">
+            <a:spAutoFit/>
+          </a:bodyPr>
+          <a:lstStyle/>
+          <a:p>
+            <a:r>
+              <a:rPr lang="en-CN" dirty="0"/>
+              <a:t>X=[34,55,774,22,4,…]</a:t>
+            </a:r>
+          </a:p>
+        </p:txBody>
+      </p:sp>
+      <p:sp>
+        <p:nvSpPr>
+          <p:cNvPr id="19" name="TextBox 18">
+            <a:extLst>
+              <a:ext uri="{FF2B5EF4-FFF2-40B4-BE49-F238E27FC236}">
+                <a16:creationId xmlns:a16="http://schemas.microsoft.com/office/drawing/2014/main" id="{3A30AB03-6D6F-02F1-99F3-A11CCC72F381}"/>
+              </a:ext>
+            </a:extLst>
+          </p:cNvPr>
+          <p:cNvSpPr txBox="1"/>
+          <p:nvPr/>
+        </p:nvSpPr>
+        <p:spPr>
+          <a:xfrm>
+            <a:off x="4852796" y="2523315"/>
+            <a:ext cx="1819729" cy="369332"/>
+          </a:xfrm>
+          <a:prstGeom prst="rect">
+            <a:avLst/>
+          </a:prstGeom>
+          <a:noFill/>
+        </p:spPr>
+        <p:txBody>
+          <a:bodyPr wrap="none" rtlCol="0">
+            <a:spAutoFit/>
+          </a:bodyPr>
+          <a:lstStyle/>
+          <a:p>
+            <a:r>
+              <a:rPr lang="en-CN" dirty="0"/>
+              <a:t>Y=[</a:t>
+            </a:r>
+            <a:r>
+              <a:rPr lang="en-CN" dirty="0">
+                <a:solidFill>
+                  <a:schemeClr val="accent2"/>
+                </a:solidFill>
+              </a:rPr>
+              <a:t>3,5,2,10,20</a:t>
+            </a:r>
+            <a:r>
+              <a:rPr lang="en-CN" dirty="0"/>
+              <a:t>,</a:t>
+            </a:r>
+            <a:r>
+              <a:rPr lang="en-CN" dirty="0">
+                <a:solidFill>
+                  <a:schemeClr val="accent2"/>
+                </a:solidFill>
+              </a:rPr>
+              <a:t>…</a:t>
+            </a:r>
+            <a:r>
+              <a:rPr lang="en-CN" dirty="0"/>
+              <a:t>]</a:t>
+            </a:r>
+          </a:p>
+        </p:txBody>
+      </p:sp>
+      <p:cxnSp>
+        <p:nvCxnSpPr>
+          <p:cNvPr id="20" name="Straight Arrow Connector 19">
+            <a:extLst>
+              <a:ext uri="{FF2B5EF4-FFF2-40B4-BE49-F238E27FC236}">
+                <a16:creationId xmlns:a16="http://schemas.microsoft.com/office/drawing/2014/main" id="{7422069E-9C97-A557-9D38-EBBEB67FD75A}"/>
+              </a:ext>
+            </a:extLst>
+          </p:cNvPr>
+          <p:cNvCxnSpPr>
+            <a:cxnSpLocks/>
+            <a:stCxn id="19" idx="2"/>
+          </p:cNvCxnSpPr>
+          <p:nvPr/>
+        </p:nvCxnSpPr>
+        <p:spPr>
+          <a:xfrm flipH="1">
+            <a:off x="5762660" y="2892647"/>
+            <a:ext cx="1" cy="1395454"/>
+          </a:xfrm>
+          <a:prstGeom prst="straightConnector1">
+            <a:avLst/>
+          </a:prstGeom>
+          <a:ln w="50800">
+            <a:solidFill>
+              <a:schemeClr val="accent1"/>
+            </a:solidFill>
+            <a:tailEnd type="triangle"/>
+          </a:ln>
+        </p:spPr>
+        <p:style>
+          <a:lnRef idx="1">
+            <a:schemeClr val="accent1"/>
+          </a:lnRef>
+          <a:fillRef idx="0">
+            <a:schemeClr val="accent1"/>
+          </a:fillRef>
+          <a:effectRef idx="0">
+            <a:schemeClr val="accent1"/>
+          </a:effectRef>
+          <a:fontRef idx="minor">
+            <a:schemeClr val="tx1"/>
+          </a:fontRef>
+        </p:style>
+      </p:cxnSp>
+      <p:sp>
+        <p:nvSpPr>
+          <p:cNvPr id="21" name="TextBox 20">
+            <a:extLst>
+              <a:ext uri="{FF2B5EF4-FFF2-40B4-BE49-F238E27FC236}">
+                <a16:creationId xmlns:a16="http://schemas.microsoft.com/office/drawing/2014/main" id="{18A96F01-C754-E880-A0E0-5E6762DB8A66}"/>
+              </a:ext>
+            </a:extLst>
+          </p:cNvPr>
+          <p:cNvSpPr txBox="1"/>
+          <p:nvPr/>
+        </p:nvSpPr>
+        <p:spPr>
+          <a:xfrm>
+            <a:off x="5232515" y="4314867"/>
+            <a:ext cx="1060290" cy="369332"/>
+          </a:xfrm>
+          <a:prstGeom prst="rect">
+            <a:avLst/>
+          </a:prstGeom>
+          <a:noFill/>
+        </p:spPr>
+        <p:txBody>
+          <a:bodyPr wrap="none" rtlCol="0">
+            <a:spAutoFit/>
+          </a:bodyPr>
+          <a:lstStyle/>
+          <a:p>
+            <a:r>
+              <a:rPr lang="en-CN" dirty="0"/>
+              <a:t>regressor</a:t>
+            </a:r>
+          </a:p>
+        </p:txBody>
+      </p:sp>
+      <p:sp>
+        <p:nvSpPr>
+          <p:cNvPr id="22" name="Rectangle 21">
+            <a:extLst>
+              <a:ext uri="{FF2B5EF4-FFF2-40B4-BE49-F238E27FC236}">
+                <a16:creationId xmlns:a16="http://schemas.microsoft.com/office/drawing/2014/main" id="{E004523D-6D5A-6843-3B65-E07E49246D9F}"/>
+              </a:ext>
+            </a:extLst>
+          </p:cNvPr>
+          <p:cNvSpPr/>
+          <p:nvPr/>
+        </p:nvSpPr>
+        <p:spPr>
+          <a:xfrm>
+            <a:off x="1476259" y="3142354"/>
+            <a:ext cx="4619740" cy="665935"/>
+          </a:xfrm>
+          <a:prstGeom prst="rect">
+            <a:avLst/>
+          </a:prstGeom>
+          <a:noFill/>
+        </p:spPr>
+        <p:style>
+          <a:lnRef idx="2">
+            <a:schemeClr val="accent1">
+              <a:shade val="50000"/>
+            </a:schemeClr>
+          </a:lnRef>
+          <a:fillRef idx="1">
+            <a:schemeClr val="accent1"/>
+          </a:fillRef>
+          <a:effectRef idx="0">
+            <a:schemeClr val="accent1"/>
+          </a:effectRef>
+          <a:fontRef idx="minor">
+            <a:schemeClr val="lt1"/>
+          </a:fontRef>
+        </p:style>
+        <p:txBody>
+          <a:bodyPr rtlCol="0" anchor="ctr"/>
+          <a:lstStyle/>
+          <a:p>
+            <a:pPr algn="ctr"/>
+            <a:r>
+              <a:rPr lang="en-CN" dirty="0">
+                <a:solidFill>
+                  <a:schemeClr val="tx1"/>
+                </a:solidFill>
+              </a:rPr>
+              <a:t>training</a:t>
+            </a:r>
+          </a:p>
+          <a:p>
+            <a:pPr algn="ctr"/>
+            <a:r>
+              <a:rPr lang="en-CN" dirty="0">
+                <a:solidFill>
+                  <a:schemeClr val="tx1"/>
+                </a:solidFill>
+              </a:rPr>
+              <a:t>with balanced </a:t>
+            </a:r>
+            <a:r>
+              <a:rPr lang="en-CN">
+                <a:solidFill>
+                  <a:schemeClr val="tx1"/>
+                </a:solidFill>
+              </a:rPr>
+              <a:t>sample weights</a:t>
+            </a:r>
+            <a:endParaRPr lang="en-CN" dirty="0">
+              <a:solidFill>
+                <a:schemeClr val="tx1"/>
+              </a:solidFill>
+            </a:endParaRPr>
+          </a:p>
+        </p:txBody>
+      </p:sp>
+      <p:sp>
+        <p:nvSpPr>
+          <p:cNvPr id="23" name="TextBox 22">
+            <a:extLst>
+              <a:ext uri="{FF2B5EF4-FFF2-40B4-BE49-F238E27FC236}">
+                <a16:creationId xmlns:a16="http://schemas.microsoft.com/office/drawing/2014/main" id="{3DE9B561-6B78-6059-7EB2-BB0814726A83}"/>
+              </a:ext>
+            </a:extLst>
+          </p:cNvPr>
+          <p:cNvSpPr txBox="1"/>
+          <p:nvPr/>
+        </p:nvSpPr>
+        <p:spPr>
+          <a:xfrm>
+            <a:off x="7496219" y="3506770"/>
+            <a:ext cx="2680990" cy="369332"/>
+          </a:xfrm>
+          <a:prstGeom prst="rect">
+            <a:avLst/>
+          </a:prstGeom>
+          <a:noFill/>
+        </p:spPr>
+        <p:txBody>
+          <a:bodyPr wrap="none" rtlCol="0">
+            <a:spAutoFit/>
+          </a:bodyPr>
+          <a:lstStyle/>
+          <a:p>
+            <a:r>
+              <a:rPr lang="en-CN" dirty="0"/>
+              <a:t>New_X=[42,8,6,34,55,774]</a:t>
+            </a:r>
+          </a:p>
+        </p:txBody>
+      </p:sp>
+      <p:sp>
+        <p:nvSpPr>
+          <p:cNvPr id="24" name="Rectangle 23">
+            <a:extLst>
+              <a:ext uri="{FF2B5EF4-FFF2-40B4-BE49-F238E27FC236}">
+                <a16:creationId xmlns:a16="http://schemas.microsoft.com/office/drawing/2014/main" id="{5C567B79-C745-A600-81D8-6114C832F6F6}"/>
+              </a:ext>
+            </a:extLst>
+          </p:cNvPr>
+          <p:cNvSpPr/>
+          <p:nvPr/>
+        </p:nvSpPr>
+        <p:spPr>
+          <a:xfrm>
+            <a:off x="1025610" y="4057996"/>
+            <a:ext cx="6005987" cy="1648113"/>
+          </a:xfrm>
+          <a:prstGeom prst="rect">
+            <a:avLst/>
+          </a:prstGeom>
+          <a:noFill/>
+        </p:spPr>
+        <p:style>
+          <a:lnRef idx="2">
+            <a:schemeClr val="accent1">
+              <a:shade val="50000"/>
+            </a:schemeClr>
+          </a:lnRef>
+          <a:fillRef idx="1">
+            <a:schemeClr val="accent1"/>
+          </a:fillRef>
+          <a:effectRef idx="0">
+            <a:schemeClr val="accent1"/>
+          </a:effectRef>
+          <a:fontRef idx="minor">
+            <a:schemeClr val="lt1"/>
+          </a:fontRef>
+        </p:style>
+        <p:txBody>
+          <a:bodyPr rtlCol="0" anchor="ctr"/>
+          <a:lstStyle/>
+          <a:p>
+            <a:pPr algn="ctr"/>
+            <a:endParaRPr lang="en-CN" dirty="0">
+              <a:solidFill>
+                <a:schemeClr val="tx1"/>
+              </a:solidFill>
+            </a:endParaRPr>
+          </a:p>
+        </p:txBody>
+      </p:sp>
+      <p:cxnSp>
+        <p:nvCxnSpPr>
+          <p:cNvPr id="25" name="Elbow Connector 24">
+            <a:extLst>
+              <a:ext uri="{FF2B5EF4-FFF2-40B4-BE49-F238E27FC236}">
+                <a16:creationId xmlns:a16="http://schemas.microsoft.com/office/drawing/2014/main" id="{05BA0D11-46C6-C7EE-E5BB-E261A506C111}"/>
+              </a:ext>
+            </a:extLst>
+          </p:cNvPr>
+          <p:cNvCxnSpPr>
+            <a:cxnSpLocks/>
+            <a:stCxn id="23" idx="2"/>
+            <a:endCxn id="24" idx="3"/>
+          </p:cNvCxnSpPr>
+          <p:nvPr/>
+        </p:nvCxnSpPr>
+        <p:spPr>
+          <a:xfrm rot="5400000">
+            <a:off x="7431181" y="3476519"/>
+            <a:ext cx="1005951" cy="1805117"/>
+          </a:xfrm>
+          <a:prstGeom prst="bentConnector2">
+            <a:avLst/>
+          </a:prstGeom>
+          <a:ln w="50800">
+            <a:solidFill>
+              <a:srgbClr val="C00000"/>
+            </a:solidFill>
+            <a:tailEnd type="triangle"/>
+          </a:ln>
+        </p:spPr>
+        <p:style>
+          <a:lnRef idx="1">
+            <a:schemeClr val="accent1"/>
+          </a:lnRef>
+          <a:fillRef idx="0">
+            <a:schemeClr val="accent1"/>
+          </a:fillRef>
+          <a:effectRef idx="0">
+            <a:schemeClr val="accent1"/>
+          </a:effectRef>
+          <a:fontRef idx="minor">
+            <a:schemeClr val="tx1"/>
+          </a:fontRef>
+        </p:style>
+      </p:cxnSp>
+      <p:cxnSp>
+        <p:nvCxnSpPr>
+          <p:cNvPr id="26" name="Straight Arrow Connector 25">
+            <a:extLst>
+              <a:ext uri="{FF2B5EF4-FFF2-40B4-BE49-F238E27FC236}">
+                <a16:creationId xmlns:a16="http://schemas.microsoft.com/office/drawing/2014/main" id="{3EEC0225-240C-C3BD-6E93-CBA3B366FE68}"/>
+              </a:ext>
+            </a:extLst>
+          </p:cNvPr>
+          <p:cNvCxnSpPr>
+            <a:cxnSpLocks/>
+            <a:stCxn id="16" idx="2"/>
+          </p:cNvCxnSpPr>
+          <p:nvPr/>
+        </p:nvCxnSpPr>
+        <p:spPr>
+          <a:xfrm>
+            <a:off x="1783302" y="4684199"/>
+            <a:ext cx="0" cy="382359"/>
+          </a:xfrm>
+          <a:prstGeom prst="straightConnector1">
+            <a:avLst/>
+          </a:prstGeom>
+          <a:ln w="50800">
+            <a:solidFill>
+              <a:srgbClr val="C00000"/>
+            </a:solidFill>
+            <a:tailEnd type="triangle"/>
+          </a:ln>
+        </p:spPr>
+        <p:style>
+          <a:lnRef idx="1">
+            <a:schemeClr val="accent1"/>
+          </a:lnRef>
+          <a:fillRef idx="0">
+            <a:schemeClr val="accent1"/>
+          </a:fillRef>
+          <a:effectRef idx="0">
+            <a:schemeClr val="accent1"/>
+          </a:effectRef>
+          <a:fontRef idx="minor">
+            <a:schemeClr val="tx1"/>
+          </a:fontRef>
+        </p:style>
+      </p:cxnSp>
+      <p:cxnSp>
+        <p:nvCxnSpPr>
+          <p:cNvPr id="27" name="Straight Arrow Connector 26">
+            <a:extLst>
+              <a:ext uri="{FF2B5EF4-FFF2-40B4-BE49-F238E27FC236}">
+                <a16:creationId xmlns:a16="http://schemas.microsoft.com/office/drawing/2014/main" id="{76979C2E-34CC-46A6-29A4-EBF87D83E780}"/>
+              </a:ext>
+            </a:extLst>
+          </p:cNvPr>
+          <p:cNvCxnSpPr>
+            <a:cxnSpLocks/>
+            <a:stCxn id="21" idx="2"/>
+          </p:cNvCxnSpPr>
+          <p:nvPr/>
+        </p:nvCxnSpPr>
+        <p:spPr>
+          <a:xfrm>
+            <a:off x="5762660" y="4684199"/>
+            <a:ext cx="0" cy="449146"/>
+          </a:xfrm>
+          <a:prstGeom prst="straightConnector1">
+            <a:avLst/>
+          </a:prstGeom>
+          <a:ln w="50800">
+            <a:solidFill>
+              <a:srgbClr val="C00000"/>
+            </a:solidFill>
+            <a:tailEnd type="triangle"/>
+          </a:ln>
+        </p:spPr>
+        <p:style>
+          <a:lnRef idx="1">
+            <a:schemeClr val="accent1"/>
+          </a:lnRef>
+          <a:fillRef idx="0">
+            <a:schemeClr val="accent1"/>
+          </a:fillRef>
+          <a:effectRef idx="0">
+            <a:schemeClr val="accent1"/>
+          </a:effectRef>
+          <a:fontRef idx="minor">
+            <a:schemeClr val="tx1"/>
+          </a:fontRef>
+        </p:style>
+      </p:cxnSp>
+      <p:sp>
+        <p:nvSpPr>
+          <p:cNvPr id="28" name="TextBox 27">
+            <a:extLst>
+              <a:ext uri="{FF2B5EF4-FFF2-40B4-BE49-F238E27FC236}">
+                <a16:creationId xmlns:a16="http://schemas.microsoft.com/office/drawing/2014/main" id="{C62AD402-098D-9C5E-8AED-92FFBE337692}"/>
+              </a:ext>
+            </a:extLst>
+          </p:cNvPr>
+          <p:cNvSpPr txBox="1"/>
+          <p:nvPr/>
+        </p:nvSpPr>
+        <p:spPr>
+          <a:xfrm>
+            <a:off x="1150626" y="5044616"/>
+            <a:ext cx="1913152" cy="369332"/>
+          </a:xfrm>
+          <a:prstGeom prst="rect">
+            <a:avLst/>
+          </a:prstGeom>
+          <a:noFill/>
+        </p:spPr>
+        <p:txBody>
+          <a:bodyPr wrap="none" rtlCol="0">
+            <a:spAutoFit/>
+          </a:bodyPr>
+          <a:lstStyle/>
+          <a:p>
+            <a:r>
+              <a:rPr lang="en-CN" dirty="0"/>
+              <a:t>New_Y=[0,0,1,1,1]</a:t>
+            </a:r>
+          </a:p>
+        </p:txBody>
+      </p:sp>
+      <p:sp>
+        <p:nvSpPr>
+          <p:cNvPr id="29" name="TextBox 28">
+            <a:extLst>
+              <a:ext uri="{FF2B5EF4-FFF2-40B4-BE49-F238E27FC236}">
+                <a16:creationId xmlns:a16="http://schemas.microsoft.com/office/drawing/2014/main" id="{B8B34993-3697-B3E6-EC57-888D8731E918}"/>
+              </a:ext>
+            </a:extLst>
+          </p:cNvPr>
+          <p:cNvSpPr txBox="1"/>
+          <p:nvPr/>
+        </p:nvSpPr>
+        <p:spPr>
+          <a:xfrm>
+            <a:off x="4629197" y="5041632"/>
+            <a:ext cx="2147191" cy="369332"/>
+          </a:xfrm>
+          <a:prstGeom prst="rect">
+            <a:avLst/>
+          </a:prstGeom>
+          <a:noFill/>
+        </p:spPr>
+        <p:txBody>
+          <a:bodyPr wrap="none" rtlCol="0">
+            <a:spAutoFit/>
+          </a:bodyPr>
+          <a:lstStyle/>
+          <a:p>
+            <a:r>
+              <a:rPr lang="en-CN" dirty="0"/>
+              <a:t>New_Y=[5,9,15,13,7]</a:t>
+            </a:r>
+          </a:p>
+        </p:txBody>
+      </p:sp>
+      <p:cxnSp>
+        <p:nvCxnSpPr>
+          <p:cNvPr id="30" name="Elbow Connector 29">
+            <a:extLst>
+              <a:ext uri="{FF2B5EF4-FFF2-40B4-BE49-F238E27FC236}">
+                <a16:creationId xmlns:a16="http://schemas.microsoft.com/office/drawing/2014/main" id="{CD4BC3DD-82FB-8D99-A332-0DB03F381110}"/>
+              </a:ext>
+            </a:extLst>
+          </p:cNvPr>
+          <p:cNvCxnSpPr>
+            <a:cxnSpLocks/>
+            <a:stCxn id="28" idx="3"/>
+            <a:endCxn id="33" idx="0"/>
+          </p:cNvCxnSpPr>
+          <p:nvPr/>
+        </p:nvCxnSpPr>
+        <p:spPr>
+          <a:xfrm>
+            <a:off x="3063778" y="5229282"/>
+            <a:ext cx="955094" cy="947695"/>
+          </a:xfrm>
+          <a:prstGeom prst="bentConnector2">
+            <a:avLst/>
+          </a:prstGeom>
+          <a:ln w="50800">
+            <a:solidFill>
+              <a:srgbClr val="C00000"/>
+            </a:solidFill>
+            <a:tailEnd type="triangle"/>
+          </a:ln>
+        </p:spPr>
+        <p:style>
+          <a:lnRef idx="1">
+            <a:schemeClr val="accent1"/>
+          </a:lnRef>
+          <a:fillRef idx="0">
+            <a:schemeClr val="accent1"/>
+          </a:fillRef>
+          <a:effectRef idx="0">
+            <a:schemeClr val="accent1"/>
+          </a:effectRef>
+          <a:fontRef idx="minor">
+            <a:schemeClr val="tx1"/>
+          </a:fontRef>
+        </p:style>
+      </p:cxnSp>
+      <p:cxnSp>
+        <p:nvCxnSpPr>
+          <p:cNvPr id="31" name="Elbow Connector 30">
+            <a:extLst>
+              <a:ext uri="{FF2B5EF4-FFF2-40B4-BE49-F238E27FC236}">
+                <a16:creationId xmlns:a16="http://schemas.microsoft.com/office/drawing/2014/main" id="{AF637C2C-6D38-E724-AF83-6877C6359FB3}"/>
+              </a:ext>
+            </a:extLst>
+          </p:cNvPr>
+          <p:cNvCxnSpPr>
+            <a:cxnSpLocks/>
+            <a:stCxn id="29" idx="1"/>
+            <a:endCxn id="33" idx="0"/>
+          </p:cNvCxnSpPr>
+          <p:nvPr/>
+        </p:nvCxnSpPr>
+        <p:spPr>
+          <a:xfrm rot="10800000" flipV="1">
+            <a:off x="4018873" y="5226297"/>
+            <a:ext cx="610325" cy="950679"/>
+          </a:xfrm>
+          <a:prstGeom prst="bentConnector2">
+            <a:avLst/>
+          </a:prstGeom>
+          <a:ln w="50800">
+            <a:solidFill>
+              <a:srgbClr val="C00000"/>
+            </a:solidFill>
+            <a:tailEnd type="triangle"/>
+          </a:ln>
+        </p:spPr>
+        <p:style>
+          <a:lnRef idx="1">
+            <a:schemeClr val="accent1"/>
+          </a:lnRef>
+          <a:fillRef idx="0">
+            <a:schemeClr val="accent1"/>
+          </a:fillRef>
+          <a:effectRef idx="0">
+            <a:schemeClr val="accent1"/>
+          </a:effectRef>
+          <a:fontRef idx="minor">
+            <a:schemeClr val="tx1"/>
+          </a:fontRef>
+        </p:style>
+      </p:cxnSp>
+      <p:sp>
+        <p:nvSpPr>
+          <p:cNvPr id="32" name="TextBox 31">
+            <a:extLst>
+              <a:ext uri="{FF2B5EF4-FFF2-40B4-BE49-F238E27FC236}">
+                <a16:creationId xmlns:a16="http://schemas.microsoft.com/office/drawing/2014/main" id="{455D0A1F-3664-B95E-60E7-B1AE7071C246}"/>
+              </a:ext>
+            </a:extLst>
+          </p:cNvPr>
+          <p:cNvSpPr txBox="1"/>
+          <p:nvPr/>
+        </p:nvSpPr>
+        <p:spPr>
+          <a:xfrm>
+            <a:off x="3299256" y="5259221"/>
+            <a:ext cx="673582" cy="369332"/>
+          </a:xfrm>
+          <a:prstGeom prst="rect">
+            <a:avLst/>
+          </a:prstGeom>
+          <a:noFill/>
+        </p:spPr>
+        <p:txBody>
+          <a:bodyPr wrap="none" rtlCol="0">
+            <a:spAutoFit/>
+          </a:bodyPr>
+          <a:lstStyle/>
+          <a:p>
+            <a:r>
+              <a:rPr lang="en-CN" dirty="0"/>
+              <a:t>mask</a:t>
+            </a:r>
+          </a:p>
+        </p:txBody>
+      </p:sp>
+      <p:sp>
+        <p:nvSpPr>
+          <p:cNvPr id="33" name="TextBox 32">
+            <a:extLst>
+              <a:ext uri="{FF2B5EF4-FFF2-40B4-BE49-F238E27FC236}">
+                <a16:creationId xmlns:a16="http://schemas.microsoft.com/office/drawing/2014/main" id="{D12DD12F-AA71-BB0C-4BF2-C75787B4C9D4}"/>
+              </a:ext>
+            </a:extLst>
+          </p:cNvPr>
+          <p:cNvSpPr txBox="1"/>
+          <p:nvPr/>
+        </p:nvSpPr>
+        <p:spPr>
+          <a:xfrm>
+            <a:off x="2945276" y="6176977"/>
+            <a:ext cx="2147191" cy="369332"/>
+          </a:xfrm>
+          <a:prstGeom prst="rect">
+            <a:avLst/>
+          </a:prstGeom>
+          <a:noFill/>
+        </p:spPr>
+        <p:txBody>
+          <a:bodyPr wrap="none" rtlCol="0">
+            <a:spAutoFit/>
+          </a:bodyPr>
+          <a:lstStyle/>
+          <a:p>
+            <a:r>
+              <a:rPr lang="en-CN" dirty="0"/>
+              <a:t>New_Y=[0,0,15,13,7]</a:t>
+            </a:r>
+          </a:p>
+        </p:txBody>
+      </p:sp>
+      <p:sp>
+        <p:nvSpPr>
+          <p:cNvPr id="34" name="TextBox 33">
+            <a:extLst>
+              <a:ext uri="{FF2B5EF4-FFF2-40B4-BE49-F238E27FC236}">
+                <a16:creationId xmlns:a16="http://schemas.microsoft.com/office/drawing/2014/main" id="{27C1D5E2-5859-0E2A-6DC4-3302BD5AA2A9}"/>
+              </a:ext>
+            </a:extLst>
+          </p:cNvPr>
+          <p:cNvSpPr txBox="1"/>
+          <p:nvPr/>
+        </p:nvSpPr>
+        <p:spPr>
+          <a:xfrm>
+            <a:off x="6906892" y="6183309"/>
+            <a:ext cx="3059492" cy="307777"/>
+          </a:xfrm>
+          <a:prstGeom prst="rect">
+            <a:avLst/>
+          </a:prstGeom>
+          <a:noFill/>
+        </p:spPr>
+        <p:txBody>
+          <a:bodyPr wrap="none" rtlCol="0">
+            <a:spAutoFit/>
+          </a:bodyPr>
+          <a:lstStyle/>
+          <a:p>
+            <a:r>
+              <a:rPr lang="en-CN" sz="1400" dirty="0"/>
+              <a:t>Figure by @chenyangkang for stemflow</a:t>
+            </a:r>
+          </a:p>
+        </p:txBody>
+      </p:sp>
+      <p:sp>
+        <p:nvSpPr>
+          <p:cNvPr id="35" name="Rectangle 34">
+            <a:extLst>
+              <a:ext uri="{FF2B5EF4-FFF2-40B4-BE49-F238E27FC236}">
+                <a16:creationId xmlns:a16="http://schemas.microsoft.com/office/drawing/2014/main" id="{8D092CFE-D205-B7B9-5AAF-69716B44D9C2}"/>
+              </a:ext>
+            </a:extLst>
+          </p:cNvPr>
+          <p:cNvSpPr/>
+          <p:nvPr/>
+        </p:nvSpPr>
+        <p:spPr>
+          <a:xfrm>
+            <a:off x="7876119" y="5394354"/>
+            <a:ext cx="211432" cy="211432"/>
+          </a:xfrm>
+          <a:prstGeom prst="rect">
+            <a:avLst/>
+          </a:prstGeom>
+        </p:spPr>
+        <p:style>
+          <a:lnRef idx="2">
+            <a:schemeClr val="accent1">
+              <a:shade val="50000"/>
+            </a:schemeClr>
+          </a:lnRef>
+          <a:fillRef idx="1">
+            <a:schemeClr val="accent1"/>
+          </a:fillRef>
+          <a:effectRef idx="0">
+            <a:schemeClr val="accent1"/>
+          </a:effectRef>
+          <a:fontRef idx="minor">
+            <a:schemeClr val="lt1"/>
+          </a:fontRef>
+        </p:style>
+        <p:txBody>
+          <a:bodyPr rtlCol="0" anchor="ctr"/>
+          <a:lstStyle/>
+          <a:p>
+            <a:pPr algn="ctr"/>
+            <a:endParaRPr lang="en-CN"/>
+          </a:p>
+        </p:txBody>
+      </p:sp>
+      <p:sp>
+        <p:nvSpPr>
+          <p:cNvPr id="36" name="TextBox 35">
+            <a:extLst>
+              <a:ext uri="{FF2B5EF4-FFF2-40B4-BE49-F238E27FC236}">
+                <a16:creationId xmlns:a16="http://schemas.microsoft.com/office/drawing/2014/main" id="{AF21F654-1383-3696-03AB-37894AE0C66F}"/>
+              </a:ext>
+            </a:extLst>
+          </p:cNvPr>
+          <p:cNvSpPr txBox="1"/>
+          <p:nvPr/>
+        </p:nvSpPr>
+        <p:spPr>
+          <a:xfrm>
+            <a:off x="8236641" y="5326556"/>
+            <a:ext cx="927049" cy="369332"/>
+          </a:xfrm>
+          <a:prstGeom prst="rect">
+            <a:avLst/>
+          </a:prstGeom>
+          <a:noFill/>
+        </p:spPr>
+        <p:txBody>
+          <a:bodyPr wrap="none" rtlCol="0">
+            <a:spAutoFit/>
+          </a:bodyPr>
+          <a:lstStyle/>
+          <a:p>
+            <a:r>
+              <a:rPr lang="en-CN" dirty="0"/>
+              <a:t>Training</a:t>
+            </a:r>
+          </a:p>
+        </p:txBody>
+      </p:sp>
+      <p:sp>
+        <p:nvSpPr>
+          <p:cNvPr id="37" name="Rectangle 36">
+            <a:extLst>
+              <a:ext uri="{FF2B5EF4-FFF2-40B4-BE49-F238E27FC236}">
+                <a16:creationId xmlns:a16="http://schemas.microsoft.com/office/drawing/2014/main" id="{37E4ADE9-6994-129B-463D-0C60CBF4D798}"/>
+              </a:ext>
+            </a:extLst>
+          </p:cNvPr>
+          <p:cNvSpPr/>
+          <p:nvPr/>
+        </p:nvSpPr>
+        <p:spPr>
+          <a:xfrm>
+            <a:off x="7870556" y="5746221"/>
+            <a:ext cx="211432" cy="211432"/>
+          </a:xfrm>
+          <a:prstGeom prst="rect">
+            <a:avLst/>
+          </a:prstGeom>
+          <a:solidFill>
+            <a:srgbClr val="C00000"/>
+          </a:solidFill>
+          <a:ln>
+            <a:solidFill>
+              <a:srgbClr val="C00000"/>
+            </a:solidFill>
+          </a:ln>
+        </p:spPr>
+        <p:style>
+          <a:lnRef idx="2">
+            <a:schemeClr val="accent1">
+              <a:shade val="50000"/>
+            </a:schemeClr>
+          </a:lnRef>
+          <a:fillRef idx="1">
+            <a:schemeClr val="accent1"/>
+          </a:fillRef>
+          <a:effectRef idx="0">
+            <a:schemeClr val="accent1"/>
+          </a:effectRef>
+          <a:fontRef idx="minor">
+            <a:schemeClr val="lt1"/>
+          </a:fontRef>
+        </p:style>
+        <p:txBody>
+          <a:bodyPr rtlCol="0" anchor="ctr"/>
+          <a:lstStyle/>
+          <a:p>
+            <a:pPr algn="ctr"/>
+            <a:endParaRPr lang="en-CN" dirty="0">
+              <a:solidFill>
+                <a:schemeClr val="tx1"/>
+              </a:solidFill>
+            </a:endParaRPr>
+          </a:p>
+        </p:txBody>
+      </p:sp>
+      <p:sp>
+        <p:nvSpPr>
+          <p:cNvPr id="38" name="TextBox 37">
+            <a:extLst>
+              <a:ext uri="{FF2B5EF4-FFF2-40B4-BE49-F238E27FC236}">
+                <a16:creationId xmlns:a16="http://schemas.microsoft.com/office/drawing/2014/main" id="{6AB36BFE-26EA-EFC8-23B5-363921D64E13}"/>
+              </a:ext>
+            </a:extLst>
+          </p:cNvPr>
+          <p:cNvSpPr txBox="1"/>
+          <p:nvPr/>
+        </p:nvSpPr>
+        <p:spPr>
+          <a:xfrm>
+            <a:off x="8231078" y="5678423"/>
+            <a:ext cx="1606081" cy="369332"/>
+          </a:xfrm>
+          <a:prstGeom prst="rect">
+            <a:avLst/>
+          </a:prstGeom>
+          <a:noFill/>
+        </p:spPr>
+        <p:txBody>
+          <a:bodyPr wrap="none" rtlCol="0">
+            <a:spAutoFit/>
+          </a:bodyPr>
+          <a:lstStyle/>
+          <a:p>
+            <a:r>
+              <a:rPr lang="en-CN" dirty="0"/>
+              <a:t>Test/prediction</a:t>
+            </a:r>
+          </a:p>
+        </p:txBody>
+      </p:sp>
+      <p:sp>
+        <p:nvSpPr>
+          <p:cNvPr id="39" name="TextBox 38">
+            <a:extLst>
+              <a:ext uri="{FF2B5EF4-FFF2-40B4-BE49-F238E27FC236}">
+                <a16:creationId xmlns:a16="http://schemas.microsoft.com/office/drawing/2014/main" id="{2F2D110E-DADD-6C39-4214-05AA3589BA02}"/>
+              </a:ext>
+            </a:extLst>
+          </p:cNvPr>
+          <p:cNvSpPr txBox="1"/>
+          <p:nvPr/>
+        </p:nvSpPr>
+        <p:spPr>
+          <a:xfrm>
+            <a:off x="943875" y="5697194"/>
+            <a:ext cx="1467133" cy="369332"/>
+          </a:xfrm>
+          <a:prstGeom prst="rect">
+            <a:avLst/>
+          </a:prstGeom>
+          <a:noFill/>
+        </p:spPr>
+        <p:txBody>
+          <a:bodyPr wrap="none" rtlCol="0">
+            <a:spAutoFit/>
+          </a:bodyPr>
+          <a:lstStyle/>
+          <a:p>
+            <a:r>
+              <a:rPr lang="en-CN" dirty="0"/>
+              <a:t>Hurdle model</a:t>
+            </a:r>
+          </a:p>
+        </p:txBody>
+      </p:sp>
+      <p:sp>
+        <p:nvSpPr>
+          <p:cNvPr id="40" name="TextBox 39">
+            <a:extLst>
+              <a:ext uri="{FF2B5EF4-FFF2-40B4-BE49-F238E27FC236}">
+                <a16:creationId xmlns:a16="http://schemas.microsoft.com/office/drawing/2014/main" id="{D6633554-941C-BAC3-399B-AA1F6AEFF9D4}"/>
+              </a:ext>
+            </a:extLst>
+          </p:cNvPr>
+          <p:cNvSpPr txBox="1"/>
+          <p:nvPr/>
+        </p:nvSpPr>
+        <p:spPr>
+          <a:xfrm>
+            <a:off x="5205045" y="1308295"/>
+            <a:ext cx="1968168" cy="369332"/>
+          </a:xfrm>
+          <a:prstGeom prst="rect">
+            <a:avLst/>
+          </a:prstGeom>
+          <a:noFill/>
+        </p:spPr>
+        <p:txBody>
+          <a:bodyPr wrap="none" rtlCol="0">
+            <a:spAutoFit/>
+          </a:bodyPr>
+          <a:lstStyle/>
+          <a:p>
+            <a:r>
+              <a:rPr lang="en-CN" dirty="0"/>
+              <a:t>positive labels only</a:t>
+            </a:r>
+          </a:p>
+        </p:txBody>
+      </p:sp>
+    </p:spTree>
+    <p:extLst>
+      <p:ext uri="{BB962C8B-B14F-4D97-AF65-F5344CB8AC3E}">
+        <p14:creationId xmlns:p14="http://schemas.microsoft.com/office/powerpoint/2010/main" val="622655931"/>
+      </p:ext>
+    </p:extLst>
+  </p:cSld>
+  <p:clrMapOvr>
+    <a:masterClrMapping/>
+  </p:clrMapOvr>
+</p:sld>
+</file>
+
 <file path=ppt/theme/theme1.xml><?xml version="1.0" encoding="utf-8"?>
 <a:theme xmlns:a="http://schemas.openxmlformats.org/drawingml/2006/main" name="Office Theme">
   <a:themeElements>

</xml_diff>

<commit_message>
fix #25 and partial to #23
</commit_message>
<xml_diff>
--- a/docs/Presentation1.pptx
+++ b/docs/Presentation1.pptx
@@ -10,6 +10,9 @@
     <p:sldId id="258" r:id="rId4"/>
     <p:sldId id="259" r:id="rId5"/>
     <p:sldId id="260" r:id="rId6"/>
+    <p:sldId id="261" r:id="rId7"/>
+    <p:sldId id="262" r:id="rId8"/>
+    <p:sldId id="263" r:id="rId9"/>
   </p:sldIdLst>
   <p:sldSz cx="12192000" cy="6858000"/>
   <p:notesSz cx="6858000" cy="9144000"/>
@@ -265,7 +268,7 @@
           <a:p>
             <a:fld id="{1101AFE0-668C-6E4E-9733-25BD1AF099FC}" type="datetimeFigureOut">
               <a:rPr lang="en-CN" smtClean="0"/>
-              <a:t>2024/1/10</a:t>
+              <a:t>2024/1/17</a:t>
             </a:fld>
             <a:endParaRPr lang="en-CN"/>
           </a:p>
@@ -465,7 +468,7 @@
           <a:p>
             <a:fld id="{1101AFE0-668C-6E4E-9733-25BD1AF099FC}" type="datetimeFigureOut">
               <a:rPr lang="en-CN" smtClean="0"/>
-              <a:t>2024/1/10</a:t>
+              <a:t>2024/1/17</a:t>
             </a:fld>
             <a:endParaRPr lang="en-CN"/>
           </a:p>
@@ -675,7 +678,7 @@
           <a:p>
             <a:fld id="{1101AFE0-668C-6E4E-9733-25BD1AF099FC}" type="datetimeFigureOut">
               <a:rPr lang="en-CN" smtClean="0"/>
-              <a:t>2024/1/10</a:t>
+              <a:t>2024/1/17</a:t>
             </a:fld>
             <a:endParaRPr lang="en-CN"/>
           </a:p>
@@ -875,7 +878,7 @@
           <a:p>
             <a:fld id="{1101AFE0-668C-6E4E-9733-25BD1AF099FC}" type="datetimeFigureOut">
               <a:rPr lang="en-CN" smtClean="0"/>
-              <a:t>2024/1/10</a:t>
+              <a:t>2024/1/17</a:t>
             </a:fld>
             <a:endParaRPr lang="en-CN"/>
           </a:p>
@@ -1151,7 +1154,7 @@
           <a:p>
             <a:fld id="{1101AFE0-668C-6E4E-9733-25BD1AF099FC}" type="datetimeFigureOut">
               <a:rPr lang="en-CN" smtClean="0"/>
-              <a:t>2024/1/10</a:t>
+              <a:t>2024/1/17</a:t>
             </a:fld>
             <a:endParaRPr lang="en-CN"/>
           </a:p>
@@ -1419,7 +1422,7 @@
           <a:p>
             <a:fld id="{1101AFE0-668C-6E4E-9733-25BD1AF099FC}" type="datetimeFigureOut">
               <a:rPr lang="en-CN" smtClean="0"/>
-              <a:t>2024/1/10</a:t>
+              <a:t>2024/1/17</a:t>
             </a:fld>
             <a:endParaRPr lang="en-CN"/>
           </a:p>
@@ -1834,7 +1837,7 @@
           <a:p>
             <a:fld id="{1101AFE0-668C-6E4E-9733-25BD1AF099FC}" type="datetimeFigureOut">
               <a:rPr lang="en-CN" smtClean="0"/>
-              <a:t>2024/1/10</a:t>
+              <a:t>2024/1/17</a:t>
             </a:fld>
             <a:endParaRPr lang="en-CN"/>
           </a:p>
@@ -1976,7 +1979,7 @@
           <a:p>
             <a:fld id="{1101AFE0-668C-6E4E-9733-25BD1AF099FC}" type="datetimeFigureOut">
               <a:rPr lang="en-CN" smtClean="0"/>
-              <a:t>2024/1/10</a:t>
+              <a:t>2024/1/17</a:t>
             </a:fld>
             <a:endParaRPr lang="en-CN"/>
           </a:p>
@@ -2089,7 +2092,7 @@
           <a:p>
             <a:fld id="{1101AFE0-668C-6E4E-9733-25BD1AF099FC}" type="datetimeFigureOut">
               <a:rPr lang="en-CN" smtClean="0"/>
-              <a:t>2024/1/10</a:t>
+              <a:t>2024/1/17</a:t>
             </a:fld>
             <a:endParaRPr lang="en-CN"/>
           </a:p>
@@ -2402,7 +2405,7 @@
           <a:p>
             <a:fld id="{1101AFE0-668C-6E4E-9733-25BD1AF099FC}" type="datetimeFigureOut">
               <a:rPr lang="en-CN" smtClean="0"/>
-              <a:t>2024/1/10</a:t>
+              <a:t>2024/1/17</a:t>
             </a:fld>
             <a:endParaRPr lang="en-CN"/>
           </a:p>
@@ -2691,7 +2694,7 @@
           <a:p>
             <a:fld id="{1101AFE0-668C-6E4E-9733-25BD1AF099FC}" type="datetimeFigureOut">
               <a:rPr lang="en-CN" smtClean="0"/>
-              <a:t>2024/1/10</a:t>
+              <a:t>2024/1/17</a:t>
             </a:fld>
             <a:endParaRPr lang="en-CN"/>
           </a:p>
@@ -2934,7 +2937,7 @@
           <a:p>
             <a:fld id="{1101AFE0-668C-6E4E-9733-25BD1AF099FC}" type="datetimeFigureOut">
               <a:rPr lang="en-CN" smtClean="0"/>
-              <a:t>2024/1/10</a:t>
+              <a:t>2024/1/17</a:t>
             </a:fld>
             <a:endParaRPr lang="en-CN"/>
           </a:p>
@@ -10740,6 +10743,2325 @@
 </p:sld>
 </file>
 
+<file path=ppt/slides/slide6.xml><?xml version="1.0" encoding="utf-8"?>
+<p:sld xmlns:a="http://schemas.openxmlformats.org/drawingml/2006/main" xmlns:r="http://schemas.openxmlformats.org/officeDocument/2006/relationships" xmlns:p="http://schemas.openxmlformats.org/presentationml/2006/main">
+  <p:cSld>
+    <p:spTree>
+      <p:nvGrpSpPr>
+        <p:cNvPr id="1" name=""/>
+        <p:cNvGrpSpPr/>
+        <p:nvPr/>
+      </p:nvGrpSpPr>
+      <p:grpSpPr>
+        <a:xfrm>
+          <a:off x="0" y="0"/>
+          <a:ext cx="0" cy="0"/>
+          <a:chOff x="0" y="0"/>
+          <a:chExt cx="0" cy="0"/>
+        </a:xfrm>
+      </p:grpSpPr>
+      <p:sp>
+        <p:nvSpPr>
+          <p:cNvPr id="4" name="TextBox 3">
+            <a:extLst>
+              <a:ext uri="{FF2B5EF4-FFF2-40B4-BE49-F238E27FC236}">
+                <a16:creationId xmlns:a16="http://schemas.microsoft.com/office/drawing/2014/main" id="{32C71932-81A7-0DDE-696A-8451A2368DF3}"/>
+              </a:ext>
+            </a:extLst>
+          </p:cNvPr>
+          <p:cNvSpPr txBox="1"/>
+          <p:nvPr/>
+        </p:nvSpPr>
+        <p:spPr>
+          <a:xfrm>
+            <a:off x="500540" y="495700"/>
+            <a:ext cx="3937040" cy="523220"/>
+          </a:xfrm>
+          <a:prstGeom prst="rect">
+            <a:avLst/>
+          </a:prstGeom>
+          <a:noFill/>
+        </p:spPr>
+        <p:txBody>
+          <a:bodyPr wrap="none" rtlCol="0">
+            <a:spAutoFit/>
+          </a:bodyPr>
+          <a:lstStyle/>
+          <a:p>
+            <a:r>
+              <a:rPr lang="en-CN" sz="2800" b="1" dirty="0"/>
+              <a:t>Sliding window approach</a:t>
+            </a:r>
+          </a:p>
+        </p:txBody>
+      </p:sp>
+      <p:sp>
+        <p:nvSpPr>
+          <p:cNvPr id="5" name="Rectangle 4">
+            <a:extLst>
+              <a:ext uri="{FF2B5EF4-FFF2-40B4-BE49-F238E27FC236}">
+                <a16:creationId xmlns:a16="http://schemas.microsoft.com/office/drawing/2014/main" id="{6D6D89AC-2308-5E65-8A3F-271283A5F0FC}"/>
+              </a:ext>
+            </a:extLst>
+          </p:cNvPr>
+          <p:cNvSpPr/>
+          <p:nvPr/>
+        </p:nvSpPr>
+        <p:spPr>
+          <a:xfrm>
+            <a:off x="7375252" y="1457686"/>
+            <a:ext cx="1080615" cy="379193"/>
+          </a:xfrm>
+          <a:prstGeom prst="rect">
+            <a:avLst/>
+          </a:prstGeom>
+          <a:solidFill>
+            <a:schemeClr val="accent6">
+              <a:alpha val="37000"/>
+            </a:schemeClr>
+          </a:solidFill>
+        </p:spPr>
+        <p:style>
+          <a:lnRef idx="2">
+            <a:schemeClr val="accent1">
+              <a:shade val="50000"/>
+            </a:schemeClr>
+          </a:lnRef>
+          <a:fillRef idx="1">
+            <a:schemeClr val="accent1"/>
+          </a:fillRef>
+          <a:effectRef idx="0">
+            <a:schemeClr val="accent1"/>
+          </a:effectRef>
+          <a:fontRef idx="minor">
+            <a:schemeClr val="lt1"/>
+          </a:fontRef>
+        </p:style>
+        <p:txBody>
+          <a:bodyPr rtlCol="0" anchor="ctr"/>
+          <a:lstStyle/>
+          <a:p>
+            <a:pPr algn="ctr"/>
+            <a:endParaRPr lang="en-CN"/>
+          </a:p>
+        </p:txBody>
+      </p:sp>
+      <p:cxnSp>
+        <p:nvCxnSpPr>
+          <p:cNvPr id="7" name="Straight Arrow Connector 6">
+            <a:extLst>
+              <a:ext uri="{FF2B5EF4-FFF2-40B4-BE49-F238E27FC236}">
+                <a16:creationId xmlns:a16="http://schemas.microsoft.com/office/drawing/2014/main" id="{27939E18-2283-B9A6-2132-164461CF1B4F}"/>
+              </a:ext>
+            </a:extLst>
+          </p:cNvPr>
+          <p:cNvCxnSpPr/>
+          <p:nvPr/>
+        </p:nvCxnSpPr>
+        <p:spPr>
+          <a:xfrm>
+            <a:off x="1753641" y="3516253"/>
+            <a:ext cx="7916779" cy="0"/>
+          </a:xfrm>
+          <a:prstGeom prst="straightConnector1">
+            <a:avLst/>
+          </a:prstGeom>
+          <a:ln w="53975">
+            <a:tailEnd type="triangle"/>
+          </a:ln>
+        </p:spPr>
+        <p:style>
+          <a:lnRef idx="1">
+            <a:schemeClr val="accent1"/>
+          </a:lnRef>
+          <a:fillRef idx="0">
+            <a:schemeClr val="accent1"/>
+          </a:fillRef>
+          <a:effectRef idx="0">
+            <a:schemeClr val="accent1"/>
+          </a:effectRef>
+          <a:fontRef idx="minor">
+            <a:schemeClr val="tx1"/>
+          </a:fontRef>
+        </p:style>
+      </p:cxnSp>
+      <p:sp>
+        <p:nvSpPr>
+          <p:cNvPr id="8" name="TextBox 7">
+            <a:extLst>
+              <a:ext uri="{FF2B5EF4-FFF2-40B4-BE49-F238E27FC236}">
+                <a16:creationId xmlns:a16="http://schemas.microsoft.com/office/drawing/2014/main" id="{CC32BA53-4B49-F89C-14A5-38045988F30D}"/>
+              </a:ext>
+            </a:extLst>
+          </p:cNvPr>
+          <p:cNvSpPr txBox="1"/>
+          <p:nvPr/>
+        </p:nvSpPr>
+        <p:spPr>
+          <a:xfrm>
+            <a:off x="1751978" y="3170556"/>
+            <a:ext cx="301686" cy="369332"/>
+          </a:xfrm>
+          <a:prstGeom prst="rect">
+            <a:avLst/>
+          </a:prstGeom>
+          <a:noFill/>
+        </p:spPr>
+        <p:txBody>
+          <a:bodyPr wrap="none" rtlCol="0">
+            <a:spAutoFit/>
+          </a:bodyPr>
+          <a:lstStyle/>
+          <a:p>
+            <a:r>
+              <a:rPr lang="en-CN" dirty="0"/>
+              <a:t>1</a:t>
+            </a:r>
+          </a:p>
+        </p:txBody>
+      </p:sp>
+      <p:sp>
+        <p:nvSpPr>
+          <p:cNvPr id="9" name="TextBox 8">
+            <a:extLst>
+              <a:ext uri="{FF2B5EF4-FFF2-40B4-BE49-F238E27FC236}">
+                <a16:creationId xmlns:a16="http://schemas.microsoft.com/office/drawing/2014/main" id="{8BCC9EC0-9C02-50FA-65E8-AC2E22A10CD3}"/>
+              </a:ext>
+            </a:extLst>
+          </p:cNvPr>
+          <p:cNvSpPr txBox="1"/>
+          <p:nvPr/>
+        </p:nvSpPr>
+        <p:spPr>
+          <a:xfrm>
+            <a:off x="5041783" y="2929135"/>
+            <a:ext cx="1243546" cy="369332"/>
+          </a:xfrm>
+          <a:prstGeom prst="rect">
+            <a:avLst/>
+          </a:prstGeom>
+          <a:noFill/>
+        </p:spPr>
+        <p:txBody>
+          <a:bodyPr wrap="none" rtlCol="0">
+            <a:spAutoFit/>
+          </a:bodyPr>
+          <a:lstStyle/>
+          <a:p>
+            <a:r>
+              <a:rPr lang="en-CN" dirty="0"/>
+              <a:t>Day of year</a:t>
+            </a:r>
+          </a:p>
+        </p:txBody>
+      </p:sp>
+      <p:sp>
+        <p:nvSpPr>
+          <p:cNvPr id="10" name="TextBox 9">
+            <a:extLst>
+              <a:ext uri="{FF2B5EF4-FFF2-40B4-BE49-F238E27FC236}">
+                <a16:creationId xmlns:a16="http://schemas.microsoft.com/office/drawing/2014/main" id="{DCC35A17-29AB-A1C0-7F47-9EFB495915D3}"/>
+              </a:ext>
+            </a:extLst>
+          </p:cNvPr>
+          <p:cNvSpPr txBox="1"/>
+          <p:nvPr/>
+        </p:nvSpPr>
+        <p:spPr>
+          <a:xfrm>
+            <a:off x="9134696" y="3113801"/>
+            <a:ext cx="535724" cy="369332"/>
+          </a:xfrm>
+          <a:prstGeom prst="rect">
+            <a:avLst/>
+          </a:prstGeom>
+          <a:noFill/>
+        </p:spPr>
+        <p:txBody>
+          <a:bodyPr wrap="none" rtlCol="0">
+            <a:spAutoFit/>
+          </a:bodyPr>
+          <a:lstStyle/>
+          <a:p>
+            <a:r>
+              <a:rPr lang="en-CN" dirty="0"/>
+              <a:t>366</a:t>
+            </a:r>
+          </a:p>
+        </p:txBody>
+      </p:sp>
+      <p:sp>
+        <p:nvSpPr>
+          <p:cNvPr id="14" name="Right Brace 13">
+            <a:extLst>
+              <a:ext uri="{FF2B5EF4-FFF2-40B4-BE49-F238E27FC236}">
+                <a16:creationId xmlns:a16="http://schemas.microsoft.com/office/drawing/2014/main" id="{433D198F-443D-DCE5-C6B3-A4E8B1E215CF}"/>
+              </a:ext>
+            </a:extLst>
+          </p:cNvPr>
+          <p:cNvSpPr/>
+          <p:nvPr/>
+        </p:nvSpPr>
+        <p:spPr>
+          <a:xfrm rot="16200000">
+            <a:off x="7860093" y="744245"/>
+            <a:ext cx="110934" cy="1080615"/>
+          </a:xfrm>
+          <a:prstGeom prst="rightBrace">
+            <a:avLst/>
+          </a:prstGeom>
+          <a:ln w="25400"/>
+        </p:spPr>
+        <p:style>
+          <a:lnRef idx="1">
+            <a:schemeClr val="accent1"/>
+          </a:lnRef>
+          <a:fillRef idx="0">
+            <a:schemeClr val="accent1"/>
+          </a:fillRef>
+          <a:effectRef idx="0">
+            <a:schemeClr val="accent1"/>
+          </a:effectRef>
+          <a:fontRef idx="minor">
+            <a:schemeClr val="tx1"/>
+          </a:fontRef>
+        </p:style>
+        <p:txBody>
+          <a:bodyPr rtlCol="0" anchor="ctr"/>
+          <a:lstStyle/>
+          <a:p>
+            <a:pPr algn="ctr"/>
+            <a:endParaRPr lang="en-CN"/>
+          </a:p>
+        </p:txBody>
+      </p:sp>
+      <p:sp>
+        <p:nvSpPr>
+          <p:cNvPr id="15" name="TextBox 14">
+            <a:extLst>
+              <a:ext uri="{FF2B5EF4-FFF2-40B4-BE49-F238E27FC236}">
+                <a16:creationId xmlns:a16="http://schemas.microsoft.com/office/drawing/2014/main" id="{A06F20F0-71F4-A9D9-8C65-1AC66231D464}"/>
+              </a:ext>
+            </a:extLst>
+          </p:cNvPr>
+          <p:cNvSpPr txBox="1"/>
+          <p:nvPr/>
+        </p:nvSpPr>
+        <p:spPr>
+          <a:xfrm>
+            <a:off x="6870497" y="912578"/>
+            <a:ext cx="2551789" cy="307777"/>
+          </a:xfrm>
+          <a:prstGeom prst="rect">
+            <a:avLst/>
+          </a:prstGeom>
+          <a:noFill/>
+        </p:spPr>
+        <p:txBody>
+          <a:bodyPr wrap="none" rtlCol="0">
+            <a:spAutoFit/>
+          </a:bodyPr>
+          <a:lstStyle>
+            <a:defPPr>
+              <a:defRPr lang="en-CN"/>
+            </a:defPPr>
+          </a:lstStyle>
+          <a:p>
+            <a:r>
+              <a:rPr lang="en-US" sz="1400" dirty="0" err="1"/>
+              <a:t>temporal_bin_interval</a:t>
+            </a:r>
+            <a:r>
+              <a:rPr lang="en-CN" sz="1400" dirty="0"/>
+              <a:t>=50 (DOY)</a:t>
+            </a:r>
+            <a:endParaRPr lang="en-US" sz="1400" dirty="0"/>
+          </a:p>
+        </p:txBody>
+      </p:sp>
+      <p:sp>
+        <p:nvSpPr>
+          <p:cNvPr id="16" name="Right Brace 15">
+            <a:extLst>
+              <a:ext uri="{FF2B5EF4-FFF2-40B4-BE49-F238E27FC236}">
+                <a16:creationId xmlns:a16="http://schemas.microsoft.com/office/drawing/2014/main" id="{52DD73FE-D533-9CF8-4350-37EAA703631D}"/>
+              </a:ext>
+            </a:extLst>
+          </p:cNvPr>
+          <p:cNvSpPr/>
+          <p:nvPr/>
+        </p:nvSpPr>
+        <p:spPr>
+          <a:xfrm rot="16200000" flipH="1">
+            <a:off x="7451797" y="2192245"/>
+            <a:ext cx="110975" cy="356938"/>
+          </a:xfrm>
+          <a:prstGeom prst="rightBrace">
+            <a:avLst/>
+          </a:prstGeom>
+          <a:ln w="25400"/>
+        </p:spPr>
+        <p:style>
+          <a:lnRef idx="1">
+            <a:schemeClr val="accent1"/>
+          </a:lnRef>
+          <a:fillRef idx="0">
+            <a:schemeClr val="accent1"/>
+          </a:fillRef>
+          <a:effectRef idx="0">
+            <a:schemeClr val="accent1"/>
+          </a:effectRef>
+          <a:fontRef idx="minor">
+            <a:schemeClr val="tx1"/>
+          </a:fontRef>
+        </p:style>
+        <p:txBody>
+          <a:bodyPr rtlCol="0" anchor="ctr"/>
+          <a:lstStyle/>
+          <a:p>
+            <a:pPr algn="ctr"/>
+            <a:endParaRPr lang="en-CN"/>
+          </a:p>
+        </p:txBody>
+      </p:sp>
+      <p:sp>
+        <p:nvSpPr>
+          <p:cNvPr id="17" name="TextBox 16">
+            <a:extLst>
+              <a:ext uri="{FF2B5EF4-FFF2-40B4-BE49-F238E27FC236}">
+                <a16:creationId xmlns:a16="http://schemas.microsoft.com/office/drawing/2014/main" id="{C4E2464A-1310-50B8-6943-AF1701A4D301}"/>
+              </a:ext>
+            </a:extLst>
+          </p:cNvPr>
+          <p:cNvSpPr txBox="1"/>
+          <p:nvPr/>
+        </p:nvSpPr>
+        <p:spPr>
+          <a:xfrm>
+            <a:off x="6833903" y="2426200"/>
+            <a:ext cx="2068323" cy="307777"/>
+          </a:xfrm>
+          <a:prstGeom prst="rect">
+            <a:avLst/>
+          </a:prstGeom>
+          <a:noFill/>
+        </p:spPr>
+        <p:txBody>
+          <a:bodyPr wrap="none" rtlCol="0">
+            <a:spAutoFit/>
+          </a:bodyPr>
+          <a:lstStyle>
+            <a:defPPr>
+              <a:defRPr lang="en-CN"/>
+            </a:defPPr>
+            <a:lvl1pPr>
+              <a:defRPr sz="1400"/>
+            </a:lvl1pPr>
+          </a:lstStyle>
+          <a:p>
+            <a:r>
+              <a:rPr lang="en-US" dirty="0" err="1"/>
+              <a:t>temporal_step</a:t>
+            </a:r>
+            <a:r>
+              <a:rPr lang="en-US" dirty="0"/>
+              <a:t> = 20 </a:t>
+            </a:r>
+            <a:r>
+              <a:rPr lang="en-CN" sz="1400" dirty="0"/>
+              <a:t>(DOY)</a:t>
+            </a:r>
+            <a:endParaRPr lang="en-US" dirty="0"/>
+          </a:p>
+        </p:txBody>
+      </p:sp>
+      <p:sp>
+        <p:nvSpPr>
+          <p:cNvPr id="19" name="Rectangle 18">
+            <a:extLst>
+              <a:ext uri="{FF2B5EF4-FFF2-40B4-BE49-F238E27FC236}">
+                <a16:creationId xmlns:a16="http://schemas.microsoft.com/office/drawing/2014/main" id="{3DC506DA-852F-CAB8-E7EA-689CEEB6DB64}"/>
+              </a:ext>
+            </a:extLst>
+          </p:cNvPr>
+          <p:cNvSpPr/>
+          <p:nvPr/>
+        </p:nvSpPr>
+        <p:spPr>
+          <a:xfrm>
+            <a:off x="7715500" y="1847402"/>
+            <a:ext cx="1080615" cy="379193"/>
+          </a:xfrm>
+          <a:prstGeom prst="rect">
+            <a:avLst/>
+          </a:prstGeom>
+          <a:solidFill>
+            <a:schemeClr val="accent6">
+              <a:alpha val="37000"/>
+            </a:schemeClr>
+          </a:solidFill>
+        </p:spPr>
+        <p:style>
+          <a:lnRef idx="2">
+            <a:schemeClr val="accent1">
+              <a:shade val="50000"/>
+            </a:schemeClr>
+          </a:lnRef>
+          <a:fillRef idx="1">
+            <a:schemeClr val="accent1"/>
+          </a:fillRef>
+          <a:effectRef idx="0">
+            <a:schemeClr val="accent1"/>
+          </a:effectRef>
+          <a:fontRef idx="minor">
+            <a:schemeClr val="lt1"/>
+          </a:fontRef>
+        </p:style>
+        <p:txBody>
+          <a:bodyPr rtlCol="0" anchor="ctr"/>
+          <a:lstStyle/>
+          <a:p>
+            <a:pPr algn="ctr"/>
+            <a:endParaRPr lang="en-CN"/>
+          </a:p>
+        </p:txBody>
+      </p:sp>
+      <p:sp>
+        <p:nvSpPr>
+          <p:cNvPr id="22" name="Rectangle 21">
+            <a:extLst>
+              <a:ext uri="{FF2B5EF4-FFF2-40B4-BE49-F238E27FC236}">
+                <a16:creationId xmlns:a16="http://schemas.microsoft.com/office/drawing/2014/main" id="{DF250997-A211-72D7-8CE1-FD9E373107CF}"/>
+              </a:ext>
+            </a:extLst>
+          </p:cNvPr>
+          <p:cNvSpPr/>
+          <p:nvPr/>
+        </p:nvSpPr>
+        <p:spPr>
+          <a:xfrm>
+            <a:off x="1388445" y="3634537"/>
+            <a:ext cx="1080615" cy="379193"/>
+          </a:xfrm>
+          <a:prstGeom prst="rect">
+            <a:avLst/>
+          </a:prstGeom>
+          <a:solidFill>
+            <a:schemeClr val="accent6">
+              <a:alpha val="36000"/>
+            </a:schemeClr>
+          </a:solidFill>
+          <a:ln w="19050">
+            <a:noFill/>
+          </a:ln>
+        </p:spPr>
+        <p:style>
+          <a:lnRef idx="2">
+            <a:schemeClr val="accent1">
+              <a:shade val="50000"/>
+            </a:schemeClr>
+          </a:lnRef>
+          <a:fillRef idx="1">
+            <a:schemeClr val="accent1"/>
+          </a:fillRef>
+          <a:effectRef idx="0">
+            <a:schemeClr val="accent1"/>
+          </a:effectRef>
+          <a:fontRef idx="minor">
+            <a:schemeClr val="lt1"/>
+          </a:fontRef>
+        </p:style>
+        <p:txBody>
+          <a:bodyPr rtlCol="0" anchor="ctr"/>
+          <a:lstStyle/>
+          <a:p>
+            <a:pPr algn="ctr"/>
+            <a:endParaRPr lang="en-CN" dirty="0"/>
+          </a:p>
+        </p:txBody>
+      </p:sp>
+      <p:sp>
+        <p:nvSpPr>
+          <p:cNvPr id="23" name="Rectangle 22">
+            <a:extLst>
+              <a:ext uri="{FF2B5EF4-FFF2-40B4-BE49-F238E27FC236}">
+                <a16:creationId xmlns:a16="http://schemas.microsoft.com/office/drawing/2014/main" id="{50E4DC27-6182-3F30-15A3-71AD15B7D146}"/>
+              </a:ext>
+            </a:extLst>
+          </p:cNvPr>
+          <p:cNvSpPr/>
+          <p:nvPr/>
+        </p:nvSpPr>
+        <p:spPr>
+          <a:xfrm>
+            <a:off x="1754046" y="3719172"/>
+            <a:ext cx="1080615" cy="379193"/>
+          </a:xfrm>
+          <a:prstGeom prst="rect">
+            <a:avLst/>
+          </a:prstGeom>
+          <a:solidFill>
+            <a:schemeClr val="accent6">
+              <a:alpha val="36000"/>
+            </a:schemeClr>
+          </a:solidFill>
+          <a:ln w="19050">
+            <a:noFill/>
+          </a:ln>
+        </p:spPr>
+        <p:style>
+          <a:lnRef idx="2">
+            <a:schemeClr val="accent1">
+              <a:shade val="50000"/>
+            </a:schemeClr>
+          </a:lnRef>
+          <a:fillRef idx="1">
+            <a:schemeClr val="accent1"/>
+          </a:fillRef>
+          <a:effectRef idx="0">
+            <a:schemeClr val="accent1"/>
+          </a:effectRef>
+          <a:fontRef idx="minor">
+            <a:schemeClr val="lt1"/>
+          </a:fontRef>
+        </p:style>
+        <p:txBody>
+          <a:bodyPr rtlCol="0" anchor="ctr"/>
+          <a:lstStyle/>
+          <a:p>
+            <a:pPr algn="ctr"/>
+            <a:endParaRPr lang="en-CN"/>
+          </a:p>
+        </p:txBody>
+      </p:sp>
+      <p:sp>
+        <p:nvSpPr>
+          <p:cNvPr id="24" name="Rectangle 23">
+            <a:extLst>
+              <a:ext uri="{FF2B5EF4-FFF2-40B4-BE49-F238E27FC236}">
+                <a16:creationId xmlns:a16="http://schemas.microsoft.com/office/drawing/2014/main" id="{C6E00941-467C-CA7E-8F56-D3A5AB001BE7}"/>
+              </a:ext>
+            </a:extLst>
+          </p:cNvPr>
+          <p:cNvSpPr/>
+          <p:nvPr/>
+        </p:nvSpPr>
+        <p:spPr>
+          <a:xfrm>
+            <a:off x="2130618" y="3819344"/>
+            <a:ext cx="1080615" cy="379193"/>
+          </a:xfrm>
+          <a:prstGeom prst="rect">
+            <a:avLst/>
+          </a:prstGeom>
+          <a:solidFill>
+            <a:schemeClr val="accent6">
+              <a:alpha val="36000"/>
+            </a:schemeClr>
+          </a:solidFill>
+          <a:ln w="19050">
+            <a:noFill/>
+          </a:ln>
+        </p:spPr>
+        <p:style>
+          <a:lnRef idx="2">
+            <a:schemeClr val="accent1">
+              <a:shade val="50000"/>
+            </a:schemeClr>
+          </a:lnRef>
+          <a:fillRef idx="1">
+            <a:schemeClr val="accent1"/>
+          </a:fillRef>
+          <a:effectRef idx="0">
+            <a:schemeClr val="accent1"/>
+          </a:effectRef>
+          <a:fontRef idx="minor">
+            <a:schemeClr val="lt1"/>
+          </a:fontRef>
+        </p:style>
+        <p:txBody>
+          <a:bodyPr rtlCol="0" anchor="ctr"/>
+          <a:lstStyle/>
+          <a:p>
+            <a:pPr algn="ctr"/>
+            <a:endParaRPr lang="en-CN"/>
+          </a:p>
+        </p:txBody>
+      </p:sp>
+      <p:sp>
+        <p:nvSpPr>
+          <p:cNvPr id="26" name="Rectangle 25">
+            <a:extLst>
+              <a:ext uri="{FF2B5EF4-FFF2-40B4-BE49-F238E27FC236}">
+                <a16:creationId xmlns:a16="http://schemas.microsoft.com/office/drawing/2014/main" id="{703AFCFA-0EE9-DB06-CE8A-15E27DF30E67}"/>
+              </a:ext>
+            </a:extLst>
+          </p:cNvPr>
+          <p:cNvSpPr/>
+          <p:nvPr/>
+        </p:nvSpPr>
+        <p:spPr>
+          <a:xfrm>
+            <a:off x="2440094" y="3942567"/>
+            <a:ext cx="1080615" cy="379193"/>
+          </a:xfrm>
+          <a:prstGeom prst="rect">
+            <a:avLst/>
+          </a:prstGeom>
+          <a:solidFill>
+            <a:schemeClr val="accent6">
+              <a:alpha val="36000"/>
+            </a:schemeClr>
+          </a:solidFill>
+          <a:ln w="19050">
+            <a:noFill/>
+          </a:ln>
+        </p:spPr>
+        <p:style>
+          <a:lnRef idx="2">
+            <a:schemeClr val="accent1">
+              <a:shade val="50000"/>
+            </a:schemeClr>
+          </a:lnRef>
+          <a:fillRef idx="1">
+            <a:schemeClr val="accent1"/>
+          </a:fillRef>
+          <a:effectRef idx="0">
+            <a:schemeClr val="accent1"/>
+          </a:effectRef>
+          <a:fontRef idx="minor">
+            <a:schemeClr val="lt1"/>
+          </a:fontRef>
+        </p:style>
+        <p:txBody>
+          <a:bodyPr rtlCol="0" anchor="ctr"/>
+          <a:lstStyle/>
+          <a:p>
+            <a:pPr algn="ctr"/>
+            <a:endParaRPr lang="en-CN"/>
+          </a:p>
+        </p:txBody>
+      </p:sp>
+      <p:sp>
+        <p:nvSpPr>
+          <p:cNvPr id="27" name="Rectangle 26">
+            <a:extLst>
+              <a:ext uri="{FF2B5EF4-FFF2-40B4-BE49-F238E27FC236}">
+                <a16:creationId xmlns:a16="http://schemas.microsoft.com/office/drawing/2014/main" id="{97A0499C-E788-FDF5-E997-009E36780598}"/>
+              </a:ext>
+            </a:extLst>
+          </p:cNvPr>
+          <p:cNvSpPr/>
+          <p:nvPr/>
+        </p:nvSpPr>
+        <p:spPr>
+          <a:xfrm>
+            <a:off x="2805695" y="4027202"/>
+            <a:ext cx="1080615" cy="379193"/>
+          </a:xfrm>
+          <a:prstGeom prst="rect">
+            <a:avLst/>
+          </a:prstGeom>
+          <a:solidFill>
+            <a:schemeClr val="accent6">
+              <a:alpha val="36000"/>
+            </a:schemeClr>
+          </a:solidFill>
+          <a:ln w="19050">
+            <a:noFill/>
+          </a:ln>
+        </p:spPr>
+        <p:style>
+          <a:lnRef idx="2">
+            <a:schemeClr val="accent1">
+              <a:shade val="50000"/>
+            </a:schemeClr>
+          </a:lnRef>
+          <a:fillRef idx="1">
+            <a:schemeClr val="accent1"/>
+          </a:fillRef>
+          <a:effectRef idx="0">
+            <a:schemeClr val="accent1"/>
+          </a:effectRef>
+          <a:fontRef idx="minor">
+            <a:schemeClr val="lt1"/>
+          </a:fontRef>
+        </p:style>
+        <p:txBody>
+          <a:bodyPr rtlCol="0" anchor="ctr"/>
+          <a:lstStyle/>
+          <a:p>
+            <a:pPr algn="ctr"/>
+            <a:endParaRPr lang="en-CN"/>
+          </a:p>
+        </p:txBody>
+      </p:sp>
+      <p:sp>
+        <p:nvSpPr>
+          <p:cNvPr id="28" name="Rectangle 27">
+            <a:extLst>
+              <a:ext uri="{FF2B5EF4-FFF2-40B4-BE49-F238E27FC236}">
+                <a16:creationId xmlns:a16="http://schemas.microsoft.com/office/drawing/2014/main" id="{E6E17D21-0E74-5B10-EF55-985DBCE84615}"/>
+              </a:ext>
+            </a:extLst>
+          </p:cNvPr>
+          <p:cNvSpPr/>
+          <p:nvPr/>
+        </p:nvSpPr>
+        <p:spPr>
+          <a:xfrm>
+            <a:off x="3182267" y="4127374"/>
+            <a:ext cx="1080615" cy="379193"/>
+          </a:xfrm>
+          <a:prstGeom prst="rect">
+            <a:avLst/>
+          </a:prstGeom>
+          <a:solidFill>
+            <a:schemeClr val="accent6">
+              <a:alpha val="36000"/>
+            </a:schemeClr>
+          </a:solidFill>
+          <a:ln w="19050">
+            <a:noFill/>
+          </a:ln>
+        </p:spPr>
+        <p:style>
+          <a:lnRef idx="2">
+            <a:schemeClr val="accent1">
+              <a:shade val="50000"/>
+            </a:schemeClr>
+          </a:lnRef>
+          <a:fillRef idx="1">
+            <a:schemeClr val="accent1"/>
+          </a:fillRef>
+          <a:effectRef idx="0">
+            <a:schemeClr val="accent1"/>
+          </a:effectRef>
+          <a:fontRef idx="minor">
+            <a:schemeClr val="lt1"/>
+          </a:fontRef>
+        </p:style>
+        <p:txBody>
+          <a:bodyPr rtlCol="0" anchor="ctr"/>
+          <a:lstStyle/>
+          <a:p>
+            <a:pPr algn="ctr"/>
+            <a:endParaRPr lang="en-CN"/>
+          </a:p>
+        </p:txBody>
+      </p:sp>
+      <p:sp>
+        <p:nvSpPr>
+          <p:cNvPr id="29" name="TextBox 28">
+            <a:extLst>
+              <a:ext uri="{FF2B5EF4-FFF2-40B4-BE49-F238E27FC236}">
+                <a16:creationId xmlns:a16="http://schemas.microsoft.com/office/drawing/2014/main" id="{E5740DDC-E536-0615-B9B0-EA11C4BA1528}"/>
+              </a:ext>
+            </a:extLst>
+          </p:cNvPr>
+          <p:cNvSpPr txBox="1"/>
+          <p:nvPr/>
+        </p:nvSpPr>
+        <p:spPr>
+          <a:xfrm>
+            <a:off x="4423718" y="4087451"/>
+            <a:ext cx="343364" cy="369332"/>
+          </a:xfrm>
+          <a:prstGeom prst="rect">
+            <a:avLst/>
+          </a:prstGeom>
+          <a:noFill/>
+        </p:spPr>
+        <p:txBody>
+          <a:bodyPr wrap="none" rtlCol="0">
+            <a:spAutoFit/>
+          </a:bodyPr>
+          <a:lstStyle/>
+          <a:p>
+            <a:r>
+              <a:rPr lang="en-CN" dirty="0"/>
+              <a:t>…</a:t>
+            </a:r>
+          </a:p>
+        </p:txBody>
+      </p:sp>
+      <p:sp>
+        <p:nvSpPr>
+          <p:cNvPr id="38" name="Down Arrow 37">
+            <a:extLst>
+              <a:ext uri="{FF2B5EF4-FFF2-40B4-BE49-F238E27FC236}">
+                <a16:creationId xmlns:a16="http://schemas.microsoft.com/office/drawing/2014/main" id="{78F1FD12-2731-3D44-CE92-6A678FB5AA5C}"/>
+              </a:ext>
+            </a:extLst>
+          </p:cNvPr>
+          <p:cNvSpPr/>
+          <p:nvPr/>
+        </p:nvSpPr>
+        <p:spPr>
+          <a:xfrm>
+            <a:off x="1442734" y="4272117"/>
+            <a:ext cx="184333" cy="379193"/>
+          </a:xfrm>
+          <a:prstGeom prst="downArrow">
+            <a:avLst/>
+          </a:prstGeom>
+          <a:solidFill>
+            <a:schemeClr val="accent1"/>
+          </a:solidFill>
+          <a:ln>
+            <a:noFill/>
+          </a:ln>
+        </p:spPr>
+        <p:style>
+          <a:lnRef idx="2">
+            <a:schemeClr val="accent1">
+              <a:shade val="50000"/>
+            </a:schemeClr>
+          </a:lnRef>
+          <a:fillRef idx="1">
+            <a:schemeClr val="accent1"/>
+          </a:fillRef>
+          <a:effectRef idx="0">
+            <a:schemeClr val="accent1"/>
+          </a:effectRef>
+          <a:fontRef idx="minor">
+            <a:schemeClr val="lt1"/>
+          </a:fontRef>
+        </p:style>
+        <p:txBody>
+          <a:bodyPr rtlCol="0" anchor="ctr"/>
+          <a:lstStyle/>
+          <a:p>
+            <a:pPr algn="ctr"/>
+            <a:endParaRPr lang="en-CN"/>
+          </a:p>
+        </p:txBody>
+      </p:sp>
+      <p:sp>
+        <p:nvSpPr>
+          <p:cNvPr id="40" name="TextBox 39">
+            <a:extLst>
+              <a:ext uri="{FF2B5EF4-FFF2-40B4-BE49-F238E27FC236}">
+                <a16:creationId xmlns:a16="http://schemas.microsoft.com/office/drawing/2014/main" id="{86C535B0-2948-7E73-9F0E-EE1260574C2D}"/>
+              </a:ext>
+            </a:extLst>
+          </p:cNvPr>
+          <p:cNvSpPr txBox="1"/>
+          <p:nvPr/>
+        </p:nvSpPr>
+        <p:spPr>
+          <a:xfrm>
+            <a:off x="995233" y="4630685"/>
+            <a:ext cx="1079334" cy="369332"/>
+          </a:xfrm>
+          <a:prstGeom prst="rect">
+            <a:avLst/>
+          </a:prstGeom>
+          <a:noFill/>
+        </p:spPr>
+        <p:txBody>
+          <a:bodyPr wrap="none" rtlCol="0">
+            <a:spAutoFit/>
+          </a:bodyPr>
+          <a:lstStyle/>
+          <a:p>
+            <a:r>
+              <a:rPr lang="en-CN" dirty="0"/>
+              <a:t>Quadtree</a:t>
+            </a:r>
+          </a:p>
+        </p:txBody>
+      </p:sp>
+      <p:sp>
+        <p:nvSpPr>
+          <p:cNvPr id="41" name="Down Arrow 40">
+            <a:extLst>
+              <a:ext uri="{FF2B5EF4-FFF2-40B4-BE49-F238E27FC236}">
+                <a16:creationId xmlns:a16="http://schemas.microsoft.com/office/drawing/2014/main" id="{9B6D8590-1FF6-663C-3B4B-7BB1EF30DCFD}"/>
+              </a:ext>
+            </a:extLst>
+          </p:cNvPr>
+          <p:cNvSpPr/>
+          <p:nvPr/>
+        </p:nvSpPr>
+        <p:spPr>
+          <a:xfrm>
+            <a:off x="1442733" y="4993289"/>
+            <a:ext cx="184333" cy="379193"/>
+          </a:xfrm>
+          <a:prstGeom prst="downArrow">
+            <a:avLst/>
+          </a:prstGeom>
+          <a:solidFill>
+            <a:schemeClr val="accent1"/>
+          </a:solidFill>
+          <a:ln>
+            <a:noFill/>
+          </a:ln>
+        </p:spPr>
+        <p:style>
+          <a:lnRef idx="2">
+            <a:schemeClr val="accent1">
+              <a:shade val="50000"/>
+            </a:schemeClr>
+          </a:lnRef>
+          <a:fillRef idx="1">
+            <a:schemeClr val="accent1"/>
+          </a:fillRef>
+          <a:effectRef idx="0">
+            <a:schemeClr val="accent1"/>
+          </a:effectRef>
+          <a:fontRef idx="minor">
+            <a:schemeClr val="lt1"/>
+          </a:fontRef>
+        </p:style>
+        <p:txBody>
+          <a:bodyPr rtlCol="0" anchor="ctr"/>
+          <a:lstStyle/>
+          <a:p>
+            <a:pPr algn="ctr"/>
+            <a:endParaRPr lang="en-CN"/>
+          </a:p>
+        </p:txBody>
+      </p:sp>
+      <p:sp>
+        <p:nvSpPr>
+          <p:cNvPr id="42" name="TextBox 41">
+            <a:extLst>
+              <a:ext uri="{FF2B5EF4-FFF2-40B4-BE49-F238E27FC236}">
+                <a16:creationId xmlns:a16="http://schemas.microsoft.com/office/drawing/2014/main" id="{7F72B38C-DA47-DBEB-99D9-01233366A85F}"/>
+              </a:ext>
+            </a:extLst>
+          </p:cNvPr>
+          <p:cNvSpPr txBox="1"/>
+          <p:nvPr/>
+        </p:nvSpPr>
+        <p:spPr>
+          <a:xfrm>
+            <a:off x="997028" y="5372482"/>
+            <a:ext cx="1077539" cy="369332"/>
+          </a:xfrm>
+          <a:prstGeom prst="rect">
+            <a:avLst/>
+          </a:prstGeom>
+          <a:noFill/>
+        </p:spPr>
+        <p:txBody>
+          <a:bodyPr wrap="none" rtlCol="0">
+            <a:spAutoFit/>
+          </a:bodyPr>
+          <a:lstStyle/>
+          <a:p>
+            <a:r>
+              <a:rPr lang="en-CN" dirty="0"/>
+              <a:t>Modeling</a:t>
+            </a:r>
+          </a:p>
+        </p:txBody>
+      </p:sp>
+      <p:sp>
+        <p:nvSpPr>
+          <p:cNvPr id="43" name="Down Arrow 42">
+            <a:extLst>
+              <a:ext uri="{FF2B5EF4-FFF2-40B4-BE49-F238E27FC236}">
+                <a16:creationId xmlns:a16="http://schemas.microsoft.com/office/drawing/2014/main" id="{D129B28F-05F5-D258-EE57-99EE164A9C72}"/>
+              </a:ext>
+            </a:extLst>
+          </p:cNvPr>
+          <p:cNvSpPr/>
+          <p:nvPr/>
+        </p:nvSpPr>
+        <p:spPr>
+          <a:xfrm>
+            <a:off x="2350322" y="4538343"/>
+            <a:ext cx="184333" cy="379193"/>
+          </a:xfrm>
+          <a:prstGeom prst="downArrow">
+            <a:avLst/>
+          </a:prstGeom>
+          <a:solidFill>
+            <a:schemeClr val="accent1"/>
+          </a:solidFill>
+          <a:ln>
+            <a:noFill/>
+          </a:ln>
+        </p:spPr>
+        <p:style>
+          <a:lnRef idx="2">
+            <a:schemeClr val="accent1">
+              <a:shade val="50000"/>
+            </a:schemeClr>
+          </a:lnRef>
+          <a:fillRef idx="1">
+            <a:schemeClr val="accent1"/>
+          </a:fillRef>
+          <a:effectRef idx="0">
+            <a:schemeClr val="accent1"/>
+          </a:effectRef>
+          <a:fontRef idx="minor">
+            <a:schemeClr val="lt1"/>
+          </a:fontRef>
+        </p:style>
+        <p:txBody>
+          <a:bodyPr rtlCol="0" anchor="ctr"/>
+          <a:lstStyle/>
+          <a:p>
+            <a:pPr algn="ctr"/>
+            <a:endParaRPr lang="en-CN"/>
+          </a:p>
+        </p:txBody>
+      </p:sp>
+      <p:sp>
+        <p:nvSpPr>
+          <p:cNvPr id="44" name="TextBox 43">
+            <a:extLst>
+              <a:ext uri="{FF2B5EF4-FFF2-40B4-BE49-F238E27FC236}">
+                <a16:creationId xmlns:a16="http://schemas.microsoft.com/office/drawing/2014/main" id="{4461EE08-F44D-E14A-2627-236E14E63F4C}"/>
+              </a:ext>
+            </a:extLst>
+          </p:cNvPr>
+          <p:cNvSpPr txBox="1"/>
+          <p:nvPr/>
+        </p:nvSpPr>
+        <p:spPr>
+          <a:xfrm>
+            <a:off x="1902821" y="4896911"/>
+            <a:ext cx="1079334" cy="369332"/>
+          </a:xfrm>
+          <a:prstGeom prst="rect">
+            <a:avLst/>
+          </a:prstGeom>
+          <a:noFill/>
+        </p:spPr>
+        <p:txBody>
+          <a:bodyPr wrap="none" rtlCol="0">
+            <a:spAutoFit/>
+          </a:bodyPr>
+          <a:lstStyle/>
+          <a:p>
+            <a:r>
+              <a:rPr lang="en-CN" dirty="0"/>
+              <a:t>Quadtree</a:t>
+            </a:r>
+          </a:p>
+        </p:txBody>
+      </p:sp>
+      <p:sp>
+        <p:nvSpPr>
+          <p:cNvPr id="45" name="Down Arrow 44">
+            <a:extLst>
+              <a:ext uri="{FF2B5EF4-FFF2-40B4-BE49-F238E27FC236}">
+                <a16:creationId xmlns:a16="http://schemas.microsoft.com/office/drawing/2014/main" id="{E40E49B1-940B-728A-9EF0-E19C2936B544}"/>
+              </a:ext>
+            </a:extLst>
+          </p:cNvPr>
+          <p:cNvSpPr/>
+          <p:nvPr/>
+        </p:nvSpPr>
+        <p:spPr>
+          <a:xfrm>
+            <a:off x="2350321" y="5259515"/>
+            <a:ext cx="184333" cy="379193"/>
+          </a:xfrm>
+          <a:prstGeom prst="downArrow">
+            <a:avLst/>
+          </a:prstGeom>
+          <a:solidFill>
+            <a:schemeClr val="accent1"/>
+          </a:solidFill>
+          <a:ln>
+            <a:noFill/>
+          </a:ln>
+        </p:spPr>
+        <p:style>
+          <a:lnRef idx="2">
+            <a:schemeClr val="accent1">
+              <a:shade val="50000"/>
+            </a:schemeClr>
+          </a:lnRef>
+          <a:fillRef idx="1">
+            <a:schemeClr val="accent1"/>
+          </a:fillRef>
+          <a:effectRef idx="0">
+            <a:schemeClr val="accent1"/>
+          </a:effectRef>
+          <a:fontRef idx="minor">
+            <a:schemeClr val="lt1"/>
+          </a:fontRef>
+        </p:style>
+        <p:txBody>
+          <a:bodyPr rtlCol="0" anchor="ctr"/>
+          <a:lstStyle/>
+          <a:p>
+            <a:pPr algn="ctr"/>
+            <a:endParaRPr lang="en-CN"/>
+          </a:p>
+        </p:txBody>
+      </p:sp>
+      <p:sp>
+        <p:nvSpPr>
+          <p:cNvPr id="46" name="TextBox 45">
+            <a:extLst>
+              <a:ext uri="{FF2B5EF4-FFF2-40B4-BE49-F238E27FC236}">
+                <a16:creationId xmlns:a16="http://schemas.microsoft.com/office/drawing/2014/main" id="{4BEE89E7-0A13-D471-B087-30A683C2712D}"/>
+              </a:ext>
+            </a:extLst>
+          </p:cNvPr>
+          <p:cNvSpPr txBox="1"/>
+          <p:nvPr/>
+        </p:nvSpPr>
+        <p:spPr>
+          <a:xfrm>
+            <a:off x="1904616" y="5638708"/>
+            <a:ext cx="1077539" cy="369332"/>
+          </a:xfrm>
+          <a:prstGeom prst="rect">
+            <a:avLst/>
+          </a:prstGeom>
+          <a:noFill/>
+        </p:spPr>
+        <p:txBody>
+          <a:bodyPr wrap="none" rtlCol="0">
+            <a:spAutoFit/>
+          </a:bodyPr>
+          <a:lstStyle/>
+          <a:p>
+            <a:r>
+              <a:rPr lang="en-CN" dirty="0"/>
+              <a:t>Modeling</a:t>
+            </a:r>
+          </a:p>
+        </p:txBody>
+      </p:sp>
+      <p:sp>
+        <p:nvSpPr>
+          <p:cNvPr id="47" name="TextBox 46">
+            <a:extLst>
+              <a:ext uri="{FF2B5EF4-FFF2-40B4-BE49-F238E27FC236}">
+                <a16:creationId xmlns:a16="http://schemas.microsoft.com/office/drawing/2014/main" id="{C5B70393-6468-B156-EA9C-5D62E33F07A7}"/>
+              </a:ext>
+            </a:extLst>
+          </p:cNvPr>
+          <p:cNvSpPr txBox="1"/>
+          <p:nvPr/>
+        </p:nvSpPr>
+        <p:spPr>
+          <a:xfrm>
+            <a:off x="3257909" y="5187816"/>
+            <a:ext cx="343364" cy="369332"/>
+          </a:xfrm>
+          <a:prstGeom prst="rect">
+            <a:avLst/>
+          </a:prstGeom>
+          <a:noFill/>
+        </p:spPr>
+        <p:txBody>
+          <a:bodyPr wrap="none" rtlCol="0">
+            <a:spAutoFit/>
+          </a:bodyPr>
+          <a:lstStyle/>
+          <a:p>
+            <a:r>
+              <a:rPr lang="en-CN" dirty="0"/>
+              <a:t>…</a:t>
+            </a:r>
+          </a:p>
+        </p:txBody>
+      </p:sp>
+      <p:sp>
+        <p:nvSpPr>
+          <p:cNvPr id="48" name="Down Arrow 47">
+            <a:extLst>
+              <a:ext uri="{FF2B5EF4-FFF2-40B4-BE49-F238E27FC236}">
+                <a16:creationId xmlns:a16="http://schemas.microsoft.com/office/drawing/2014/main" id="{AA05944E-6752-4EDA-91B8-11B1F73BD5BC}"/>
+              </a:ext>
+            </a:extLst>
+          </p:cNvPr>
+          <p:cNvSpPr/>
+          <p:nvPr/>
+        </p:nvSpPr>
+        <p:spPr>
+          <a:xfrm>
+            <a:off x="8444417" y="4511367"/>
+            <a:ext cx="184333" cy="379193"/>
+          </a:xfrm>
+          <a:prstGeom prst="downArrow">
+            <a:avLst/>
+          </a:prstGeom>
+          <a:solidFill>
+            <a:schemeClr val="accent1"/>
+          </a:solidFill>
+          <a:ln>
+            <a:noFill/>
+          </a:ln>
+        </p:spPr>
+        <p:style>
+          <a:lnRef idx="2">
+            <a:schemeClr val="accent1">
+              <a:shade val="50000"/>
+            </a:schemeClr>
+          </a:lnRef>
+          <a:fillRef idx="1">
+            <a:schemeClr val="accent1"/>
+          </a:fillRef>
+          <a:effectRef idx="0">
+            <a:schemeClr val="accent1"/>
+          </a:effectRef>
+          <a:fontRef idx="minor">
+            <a:schemeClr val="lt1"/>
+          </a:fontRef>
+        </p:style>
+        <p:txBody>
+          <a:bodyPr rtlCol="0" anchor="ctr"/>
+          <a:lstStyle/>
+          <a:p>
+            <a:pPr algn="ctr"/>
+            <a:endParaRPr lang="en-CN"/>
+          </a:p>
+        </p:txBody>
+      </p:sp>
+      <p:sp>
+        <p:nvSpPr>
+          <p:cNvPr id="49" name="TextBox 48">
+            <a:extLst>
+              <a:ext uri="{FF2B5EF4-FFF2-40B4-BE49-F238E27FC236}">
+                <a16:creationId xmlns:a16="http://schemas.microsoft.com/office/drawing/2014/main" id="{A0CC764B-D357-5FD8-5CC2-3D6A9F2E5029}"/>
+              </a:ext>
+            </a:extLst>
+          </p:cNvPr>
+          <p:cNvSpPr txBox="1"/>
+          <p:nvPr/>
+        </p:nvSpPr>
+        <p:spPr>
+          <a:xfrm>
+            <a:off x="7996916" y="4869935"/>
+            <a:ext cx="1079334" cy="369332"/>
+          </a:xfrm>
+          <a:prstGeom prst="rect">
+            <a:avLst/>
+          </a:prstGeom>
+          <a:noFill/>
+        </p:spPr>
+        <p:txBody>
+          <a:bodyPr wrap="none" rtlCol="0">
+            <a:spAutoFit/>
+          </a:bodyPr>
+          <a:lstStyle/>
+          <a:p>
+            <a:r>
+              <a:rPr lang="en-CN" dirty="0"/>
+              <a:t>Quadtree</a:t>
+            </a:r>
+          </a:p>
+        </p:txBody>
+      </p:sp>
+      <p:sp>
+        <p:nvSpPr>
+          <p:cNvPr id="50" name="Down Arrow 49">
+            <a:extLst>
+              <a:ext uri="{FF2B5EF4-FFF2-40B4-BE49-F238E27FC236}">
+                <a16:creationId xmlns:a16="http://schemas.microsoft.com/office/drawing/2014/main" id="{3E6F6D06-405C-DE1E-19FA-D8311C68EFAE}"/>
+              </a:ext>
+            </a:extLst>
+          </p:cNvPr>
+          <p:cNvSpPr/>
+          <p:nvPr/>
+        </p:nvSpPr>
+        <p:spPr>
+          <a:xfrm>
+            <a:off x="8444416" y="5232539"/>
+            <a:ext cx="184333" cy="379193"/>
+          </a:xfrm>
+          <a:prstGeom prst="downArrow">
+            <a:avLst/>
+          </a:prstGeom>
+          <a:solidFill>
+            <a:schemeClr val="accent1"/>
+          </a:solidFill>
+          <a:ln>
+            <a:noFill/>
+          </a:ln>
+        </p:spPr>
+        <p:style>
+          <a:lnRef idx="2">
+            <a:schemeClr val="accent1">
+              <a:shade val="50000"/>
+            </a:schemeClr>
+          </a:lnRef>
+          <a:fillRef idx="1">
+            <a:schemeClr val="accent1"/>
+          </a:fillRef>
+          <a:effectRef idx="0">
+            <a:schemeClr val="accent1"/>
+          </a:effectRef>
+          <a:fontRef idx="minor">
+            <a:schemeClr val="lt1"/>
+          </a:fontRef>
+        </p:style>
+        <p:txBody>
+          <a:bodyPr rtlCol="0" anchor="ctr"/>
+          <a:lstStyle/>
+          <a:p>
+            <a:pPr algn="ctr"/>
+            <a:endParaRPr lang="en-CN"/>
+          </a:p>
+        </p:txBody>
+      </p:sp>
+      <p:sp>
+        <p:nvSpPr>
+          <p:cNvPr id="51" name="TextBox 50">
+            <a:extLst>
+              <a:ext uri="{FF2B5EF4-FFF2-40B4-BE49-F238E27FC236}">
+                <a16:creationId xmlns:a16="http://schemas.microsoft.com/office/drawing/2014/main" id="{712CE6FE-7A38-3BA6-AB96-692F01B01B96}"/>
+              </a:ext>
+            </a:extLst>
+          </p:cNvPr>
+          <p:cNvSpPr txBox="1"/>
+          <p:nvPr/>
+        </p:nvSpPr>
+        <p:spPr>
+          <a:xfrm>
+            <a:off x="7998711" y="5611732"/>
+            <a:ext cx="1077539" cy="369332"/>
+          </a:xfrm>
+          <a:prstGeom prst="rect">
+            <a:avLst/>
+          </a:prstGeom>
+          <a:noFill/>
+        </p:spPr>
+        <p:txBody>
+          <a:bodyPr wrap="none" rtlCol="0">
+            <a:spAutoFit/>
+          </a:bodyPr>
+          <a:lstStyle/>
+          <a:p>
+            <a:r>
+              <a:rPr lang="en-CN" dirty="0"/>
+              <a:t>Modeling</a:t>
+            </a:r>
+          </a:p>
+        </p:txBody>
+      </p:sp>
+      <p:sp>
+        <p:nvSpPr>
+          <p:cNvPr id="52" name="Down Arrow 51">
+            <a:extLst>
+              <a:ext uri="{FF2B5EF4-FFF2-40B4-BE49-F238E27FC236}">
+                <a16:creationId xmlns:a16="http://schemas.microsoft.com/office/drawing/2014/main" id="{811F22CA-CD31-B9A8-8C5D-B49EBB26A3CA}"/>
+              </a:ext>
+            </a:extLst>
+          </p:cNvPr>
+          <p:cNvSpPr/>
+          <p:nvPr/>
+        </p:nvSpPr>
+        <p:spPr>
+          <a:xfrm>
+            <a:off x="9352005" y="4777593"/>
+            <a:ext cx="184333" cy="379193"/>
+          </a:xfrm>
+          <a:prstGeom prst="downArrow">
+            <a:avLst/>
+          </a:prstGeom>
+          <a:solidFill>
+            <a:schemeClr val="accent1"/>
+          </a:solidFill>
+          <a:ln>
+            <a:noFill/>
+          </a:ln>
+        </p:spPr>
+        <p:style>
+          <a:lnRef idx="2">
+            <a:schemeClr val="accent1">
+              <a:shade val="50000"/>
+            </a:schemeClr>
+          </a:lnRef>
+          <a:fillRef idx="1">
+            <a:schemeClr val="accent1"/>
+          </a:fillRef>
+          <a:effectRef idx="0">
+            <a:schemeClr val="accent1"/>
+          </a:effectRef>
+          <a:fontRef idx="minor">
+            <a:schemeClr val="lt1"/>
+          </a:fontRef>
+        </p:style>
+        <p:txBody>
+          <a:bodyPr rtlCol="0" anchor="ctr"/>
+          <a:lstStyle/>
+          <a:p>
+            <a:pPr algn="ctr"/>
+            <a:endParaRPr lang="en-CN"/>
+          </a:p>
+        </p:txBody>
+      </p:sp>
+      <p:sp>
+        <p:nvSpPr>
+          <p:cNvPr id="57" name="TextBox 56">
+            <a:extLst>
+              <a:ext uri="{FF2B5EF4-FFF2-40B4-BE49-F238E27FC236}">
+                <a16:creationId xmlns:a16="http://schemas.microsoft.com/office/drawing/2014/main" id="{5E7879D6-2665-638C-394F-7FEE7FF039F1}"/>
+              </a:ext>
+            </a:extLst>
+          </p:cNvPr>
+          <p:cNvSpPr txBox="1"/>
+          <p:nvPr/>
+        </p:nvSpPr>
+        <p:spPr>
+          <a:xfrm>
+            <a:off x="8891917" y="5177965"/>
+            <a:ext cx="1079334" cy="369332"/>
+          </a:xfrm>
+          <a:prstGeom prst="rect">
+            <a:avLst/>
+          </a:prstGeom>
+          <a:noFill/>
+        </p:spPr>
+        <p:txBody>
+          <a:bodyPr wrap="none" rtlCol="0">
+            <a:spAutoFit/>
+          </a:bodyPr>
+          <a:lstStyle/>
+          <a:p>
+            <a:r>
+              <a:rPr lang="en-CN" dirty="0"/>
+              <a:t>Quadtree</a:t>
+            </a:r>
+          </a:p>
+        </p:txBody>
+      </p:sp>
+      <p:sp>
+        <p:nvSpPr>
+          <p:cNvPr id="58" name="Down Arrow 57">
+            <a:extLst>
+              <a:ext uri="{FF2B5EF4-FFF2-40B4-BE49-F238E27FC236}">
+                <a16:creationId xmlns:a16="http://schemas.microsoft.com/office/drawing/2014/main" id="{861343F0-25F6-59B2-DF54-291248A04CD3}"/>
+              </a:ext>
+            </a:extLst>
+          </p:cNvPr>
+          <p:cNvSpPr/>
+          <p:nvPr/>
+        </p:nvSpPr>
+        <p:spPr>
+          <a:xfrm>
+            <a:off x="9339417" y="5540569"/>
+            <a:ext cx="184333" cy="379193"/>
+          </a:xfrm>
+          <a:prstGeom prst="downArrow">
+            <a:avLst/>
+          </a:prstGeom>
+          <a:solidFill>
+            <a:schemeClr val="accent1"/>
+          </a:solidFill>
+          <a:ln>
+            <a:noFill/>
+          </a:ln>
+        </p:spPr>
+        <p:style>
+          <a:lnRef idx="2">
+            <a:schemeClr val="accent1">
+              <a:shade val="50000"/>
+            </a:schemeClr>
+          </a:lnRef>
+          <a:fillRef idx="1">
+            <a:schemeClr val="accent1"/>
+          </a:fillRef>
+          <a:effectRef idx="0">
+            <a:schemeClr val="accent1"/>
+          </a:effectRef>
+          <a:fontRef idx="minor">
+            <a:schemeClr val="lt1"/>
+          </a:fontRef>
+        </p:style>
+        <p:txBody>
+          <a:bodyPr rtlCol="0" anchor="ctr"/>
+          <a:lstStyle/>
+          <a:p>
+            <a:pPr algn="ctr"/>
+            <a:endParaRPr lang="en-CN"/>
+          </a:p>
+        </p:txBody>
+      </p:sp>
+      <p:sp>
+        <p:nvSpPr>
+          <p:cNvPr id="59" name="TextBox 58">
+            <a:extLst>
+              <a:ext uri="{FF2B5EF4-FFF2-40B4-BE49-F238E27FC236}">
+                <a16:creationId xmlns:a16="http://schemas.microsoft.com/office/drawing/2014/main" id="{F8F97C26-991B-760C-4FF6-929CB1DA3D06}"/>
+              </a:ext>
+            </a:extLst>
+          </p:cNvPr>
+          <p:cNvSpPr txBox="1"/>
+          <p:nvPr/>
+        </p:nvSpPr>
+        <p:spPr>
+          <a:xfrm>
+            <a:off x="8893712" y="5919762"/>
+            <a:ext cx="1077539" cy="369332"/>
+          </a:xfrm>
+          <a:prstGeom prst="rect">
+            <a:avLst/>
+          </a:prstGeom>
+          <a:noFill/>
+        </p:spPr>
+        <p:txBody>
+          <a:bodyPr wrap="none" rtlCol="0">
+            <a:spAutoFit/>
+          </a:bodyPr>
+          <a:lstStyle/>
+          <a:p>
+            <a:r>
+              <a:rPr lang="en-CN" dirty="0"/>
+              <a:t>Modeling</a:t>
+            </a:r>
+          </a:p>
+        </p:txBody>
+      </p:sp>
+      <p:sp>
+        <p:nvSpPr>
+          <p:cNvPr id="60" name="Rectangle 59">
+            <a:extLst>
+              <a:ext uri="{FF2B5EF4-FFF2-40B4-BE49-F238E27FC236}">
+                <a16:creationId xmlns:a16="http://schemas.microsoft.com/office/drawing/2014/main" id="{93EFEE56-6846-D0C3-11A0-3BD2078D0F86}"/>
+              </a:ext>
+            </a:extLst>
+          </p:cNvPr>
+          <p:cNvSpPr/>
+          <p:nvPr/>
+        </p:nvSpPr>
+        <p:spPr>
+          <a:xfrm>
+            <a:off x="7456608" y="3634537"/>
+            <a:ext cx="1080615" cy="379193"/>
+          </a:xfrm>
+          <a:prstGeom prst="rect">
+            <a:avLst/>
+          </a:prstGeom>
+          <a:solidFill>
+            <a:schemeClr val="accent6">
+              <a:alpha val="36000"/>
+            </a:schemeClr>
+          </a:solidFill>
+          <a:ln w="19050">
+            <a:noFill/>
+          </a:ln>
+        </p:spPr>
+        <p:style>
+          <a:lnRef idx="2">
+            <a:schemeClr val="accent1">
+              <a:shade val="50000"/>
+            </a:schemeClr>
+          </a:lnRef>
+          <a:fillRef idx="1">
+            <a:schemeClr val="accent1"/>
+          </a:fillRef>
+          <a:effectRef idx="0">
+            <a:schemeClr val="accent1"/>
+          </a:effectRef>
+          <a:fontRef idx="minor">
+            <a:schemeClr val="lt1"/>
+          </a:fontRef>
+        </p:style>
+        <p:txBody>
+          <a:bodyPr rtlCol="0" anchor="ctr"/>
+          <a:lstStyle/>
+          <a:p>
+            <a:pPr algn="ctr"/>
+            <a:endParaRPr lang="en-CN" dirty="0"/>
+          </a:p>
+        </p:txBody>
+      </p:sp>
+      <p:sp>
+        <p:nvSpPr>
+          <p:cNvPr id="61" name="Rectangle 60">
+            <a:extLst>
+              <a:ext uri="{FF2B5EF4-FFF2-40B4-BE49-F238E27FC236}">
+                <a16:creationId xmlns:a16="http://schemas.microsoft.com/office/drawing/2014/main" id="{F5D08D0E-EBD3-BC6E-1428-2FF0C718021A}"/>
+              </a:ext>
+            </a:extLst>
+          </p:cNvPr>
+          <p:cNvSpPr/>
+          <p:nvPr/>
+        </p:nvSpPr>
+        <p:spPr>
+          <a:xfrm>
+            <a:off x="7822209" y="3719172"/>
+            <a:ext cx="1080615" cy="379193"/>
+          </a:xfrm>
+          <a:prstGeom prst="rect">
+            <a:avLst/>
+          </a:prstGeom>
+          <a:solidFill>
+            <a:schemeClr val="accent6">
+              <a:alpha val="36000"/>
+            </a:schemeClr>
+          </a:solidFill>
+          <a:ln w="19050">
+            <a:noFill/>
+          </a:ln>
+        </p:spPr>
+        <p:style>
+          <a:lnRef idx="2">
+            <a:schemeClr val="accent1">
+              <a:shade val="50000"/>
+            </a:schemeClr>
+          </a:lnRef>
+          <a:fillRef idx="1">
+            <a:schemeClr val="accent1"/>
+          </a:fillRef>
+          <a:effectRef idx="0">
+            <a:schemeClr val="accent1"/>
+          </a:effectRef>
+          <a:fontRef idx="minor">
+            <a:schemeClr val="lt1"/>
+          </a:fontRef>
+        </p:style>
+        <p:txBody>
+          <a:bodyPr rtlCol="0" anchor="ctr"/>
+          <a:lstStyle/>
+          <a:p>
+            <a:pPr algn="ctr"/>
+            <a:endParaRPr lang="en-CN"/>
+          </a:p>
+        </p:txBody>
+      </p:sp>
+      <p:sp>
+        <p:nvSpPr>
+          <p:cNvPr id="62" name="Rectangle 61">
+            <a:extLst>
+              <a:ext uri="{FF2B5EF4-FFF2-40B4-BE49-F238E27FC236}">
+                <a16:creationId xmlns:a16="http://schemas.microsoft.com/office/drawing/2014/main" id="{DC45CE87-8D35-DCD4-7EB3-8D898747014C}"/>
+              </a:ext>
+            </a:extLst>
+          </p:cNvPr>
+          <p:cNvSpPr/>
+          <p:nvPr/>
+        </p:nvSpPr>
+        <p:spPr>
+          <a:xfrm>
+            <a:off x="8198781" y="3819344"/>
+            <a:ext cx="1080615" cy="379193"/>
+          </a:xfrm>
+          <a:prstGeom prst="rect">
+            <a:avLst/>
+          </a:prstGeom>
+          <a:solidFill>
+            <a:schemeClr val="accent6">
+              <a:alpha val="36000"/>
+            </a:schemeClr>
+          </a:solidFill>
+          <a:ln w="19050">
+            <a:noFill/>
+          </a:ln>
+        </p:spPr>
+        <p:style>
+          <a:lnRef idx="2">
+            <a:schemeClr val="accent1">
+              <a:shade val="50000"/>
+            </a:schemeClr>
+          </a:lnRef>
+          <a:fillRef idx="1">
+            <a:schemeClr val="accent1"/>
+          </a:fillRef>
+          <a:effectRef idx="0">
+            <a:schemeClr val="accent1"/>
+          </a:effectRef>
+          <a:fontRef idx="minor">
+            <a:schemeClr val="lt1"/>
+          </a:fontRef>
+        </p:style>
+        <p:txBody>
+          <a:bodyPr rtlCol="0" anchor="ctr"/>
+          <a:lstStyle/>
+          <a:p>
+            <a:pPr algn="ctr"/>
+            <a:endParaRPr lang="en-CN"/>
+          </a:p>
+        </p:txBody>
+      </p:sp>
+      <p:sp>
+        <p:nvSpPr>
+          <p:cNvPr id="63" name="Rectangle 62">
+            <a:extLst>
+              <a:ext uri="{FF2B5EF4-FFF2-40B4-BE49-F238E27FC236}">
+                <a16:creationId xmlns:a16="http://schemas.microsoft.com/office/drawing/2014/main" id="{346E3B30-E584-ACCF-C5FE-009AB8ECCA19}"/>
+              </a:ext>
+            </a:extLst>
+          </p:cNvPr>
+          <p:cNvSpPr/>
+          <p:nvPr/>
+        </p:nvSpPr>
+        <p:spPr>
+          <a:xfrm>
+            <a:off x="8508257" y="3942567"/>
+            <a:ext cx="1080615" cy="379193"/>
+          </a:xfrm>
+          <a:prstGeom prst="rect">
+            <a:avLst/>
+          </a:prstGeom>
+          <a:solidFill>
+            <a:schemeClr val="accent6">
+              <a:alpha val="36000"/>
+            </a:schemeClr>
+          </a:solidFill>
+          <a:ln w="19050">
+            <a:noFill/>
+          </a:ln>
+        </p:spPr>
+        <p:style>
+          <a:lnRef idx="2">
+            <a:schemeClr val="accent1">
+              <a:shade val="50000"/>
+            </a:schemeClr>
+          </a:lnRef>
+          <a:fillRef idx="1">
+            <a:schemeClr val="accent1"/>
+          </a:fillRef>
+          <a:effectRef idx="0">
+            <a:schemeClr val="accent1"/>
+          </a:effectRef>
+          <a:fontRef idx="minor">
+            <a:schemeClr val="lt1"/>
+          </a:fontRef>
+        </p:style>
+        <p:txBody>
+          <a:bodyPr rtlCol="0" anchor="ctr"/>
+          <a:lstStyle/>
+          <a:p>
+            <a:pPr algn="ctr"/>
+            <a:endParaRPr lang="en-CN"/>
+          </a:p>
+        </p:txBody>
+      </p:sp>
+      <p:sp>
+        <p:nvSpPr>
+          <p:cNvPr id="64" name="Rectangle 63">
+            <a:extLst>
+              <a:ext uri="{FF2B5EF4-FFF2-40B4-BE49-F238E27FC236}">
+                <a16:creationId xmlns:a16="http://schemas.microsoft.com/office/drawing/2014/main" id="{BBF411E4-A324-FCA3-9577-26C584219CFD}"/>
+              </a:ext>
+            </a:extLst>
+          </p:cNvPr>
+          <p:cNvSpPr/>
+          <p:nvPr/>
+        </p:nvSpPr>
+        <p:spPr>
+          <a:xfrm>
+            <a:off x="8873858" y="4027202"/>
+            <a:ext cx="1080615" cy="379193"/>
+          </a:xfrm>
+          <a:prstGeom prst="rect">
+            <a:avLst/>
+          </a:prstGeom>
+          <a:solidFill>
+            <a:schemeClr val="accent6">
+              <a:alpha val="36000"/>
+            </a:schemeClr>
+          </a:solidFill>
+          <a:ln w="19050">
+            <a:noFill/>
+          </a:ln>
+        </p:spPr>
+        <p:style>
+          <a:lnRef idx="2">
+            <a:schemeClr val="accent1">
+              <a:shade val="50000"/>
+            </a:schemeClr>
+          </a:lnRef>
+          <a:fillRef idx="1">
+            <a:schemeClr val="accent1"/>
+          </a:fillRef>
+          <a:effectRef idx="0">
+            <a:schemeClr val="accent1"/>
+          </a:effectRef>
+          <a:fontRef idx="minor">
+            <a:schemeClr val="lt1"/>
+          </a:fontRef>
+        </p:style>
+        <p:txBody>
+          <a:bodyPr rtlCol="0" anchor="ctr"/>
+          <a:lstStyle/>
+          <a:p>
+            <a:pPr algn="ctr"/>
+            <a:endParaRPr lang="en-CN"/>
+          </a:p>
+        </p:txBody>
+      </p:sp>
+      <p:sp>
+        <p:nvSpPr>
+          <p:cNvPr id="65" name="Rectangle 64">
+            <a:extLst>
+              <a:ext uri="{FF2B5EF4-FFF2-40B4-BE49-F238E27FC236}">
+                <a16:creationId xmlns:a16="http://schemas.microsoft.com/office/drawing/2014/main" id="{5B06F315-83F5-BCC1-A8A6-ADBFC1E00D06}"/>
+              </a:ext>
+            </a:extLst>
+          </p:cNvPr>
+          <p:cNvSpPr/>
+          <p:nvPr/>
+        </p:nvSpPr>
+        <p:spPr>
+          <a:xfrm>
+            <a:off x="9250430" y="4127374"/>
+            <a:ext cx="1080615" cy="379193"/>
+          </a:xfrm>
+          <a:prstGeom prst="rect">
+            <a:avLst/>
+          </a:prstGeom>
+          <a:solidFill>
+            <a:schemeClr val="accent6">
+              <a:alpha val="36000"/>
+            </a:schemeClr>
+          </a:solidFill>
+          <a:ln w="19050">
+            <a:noFill/>
+          </a:ln>
+        </p:spPr>
+        <p:style>
+          <a:lnRef idx="2">
+            <a:schemeClr val="accent1">
+              <a:shade val="50000"/>
+            </a:schemeClr>
+          </a:lnRef>
+          <a:fillRef idx="1">
+            <a:schemeClr val="accent1"/>
+          </a:fillRef>
+          <a:effectRef idx="0">
+            <a:schemeClr val="accent1"/>
+          </a:effectRef>
+          <a:fontRef idx="minor">
+            <a:schemeClr val="lt1"/>
+          </a:fontRef>
+        </p:style>
+        <p:txBody>
+          <a:bodyPr rtlCol="0" anchor="ctr"/>
+          <a:lstStyle/>
+          <a:p>
+            <a:pPr algn="ctr"/>
+            <a:endParaRPr lang="en-CN"/>
+          </a:p>
+        </p:txBody>
+      </p:sp>
+      <p:sp>
+        <p:nvSpPr>
+          <p:cNvPr id="67" name="Right Brace 66">
+            <a:extLst>
+              <a:ext uri="{FF2B5EF4-FFF2-40B4-BE49-F238E27FC236}">
+                <a16:creationId xmlns:a16="http://schemas.microsoft.com/office/drawing/2014/main" id="{0337A4A5-8743-7979-AA06-D86D7E840A4D}"/>
+              </a:ext>
+            </a:extLst>
+          </p:cNvPr>
+          <p:cNvSpPr/>
+          <p:nvPr/>
+        </p:nvSpPr>
+        <p:spPr>
+          <a:xfrm rot="16200000">
+            <a:off x="1503376" y="2667698"/>
+            <a:ext cx="153349" cy="356938"/>
+          </a:xfrm>
+          <a:prstGeom prst="rightBrace">
+            <a:avLst/>
+          </a:prstGeom>
+          <a:ln w="25400"/>
+        </p:spPr>
+        <p:style>
+          <a:lnRef idx="1">
+            <a:schemeClr val="accent1"/>
+          </a:lnRef>
+          <a:fillRef idx="0">
+            <a:schemeClr val="accent1"/>
+          </a:fillRef>
+          <a:effectRef idx="0">
+            <a:schemeClr val="accent1"/>
+          </a:effectRef>
+          <a:fontRef idx="minor">
+            <a:schemeClr val="tx1"/>
+          </a:fontRef>
+        </p:style>
+        <p:txBody>
+          <a:bodyPr rtlCol="0" anchor="ctr"/>
+          <a:lstStyle/>
+          <a:p>
+            <a:pPr algn="ctr"/>
+            <a:endParaRPr lang="en-CN"/>
+          </a:p>
+        </p:txBody>
+      </p:sp>
+      <p:cxnSp>
+        <p:nvCxnSpPr>
+          <p:cNvPr id="69" name="Straight Connector 68">
+            <a:extLst>
+              <a:ext uri="{FF2B5EF4-FFF2-40B4-BE49-F238E27FC236}">
+                <a16:creationId xmlns:a16="http://schemas.microsoft.com/office/drawing/2014/main" id="{DAE67400-6269-C3F4-7E3C-C0034D24C301}"/>
+              </a:ext>
+            </a:extLst>
+          </p:cNvPr>
+          <p:cNvCxnSpPr>
+            <a:cxnSpLocks/>
+          </p:cNvCxnSpPr>
+          <p:nvPr/>
+        </p:nvCxnSpPr>
+        <p:spPr>
+          <a:xfrm>
+            <a:off x="1388445" y="3087780"/>
+            <a:ext cx="0" cy="1318615"/>
+          </a:xfrm>
+          <a:prstGeom prst="line">
+            <a:avLst/>
+          </a:prstGeom>
+          <a:ln w="22225">
+            <a:solidFill>
+              <a:schemeClr val="bg2">
+                <a:lumMod val="90000"/>
+              </a:schemeClr>
+            </a:solidFill>
+            <a:prstDash val="dash"/>
+          </a:ln>
+        </p:spPr>
+        <p:style>
+          <a:lnRef idx="1">
+            <a:schemeClr val="accent1"/>
+          </a:lnRef>
+          <a:fillRef idx="0">
+            <a:schemeClr val="accent1"/>
+          </a:fillRef>
+          <a:effectRef idx="0">
+            <a:schemeClr val="accent1"/>
+          </a:effectRef>
+          <a:fontRef idx="minor">
+            <a:schemeClr val="tx1"/>
+          </a:fontRef>
+        </p:style>
+      </p:cxnSp>
+      <p:cxnSp>
+        <p:nvCxnSpPr>
+          <p:cNvPr id="72" name="Straight Connector 71">
+            <a:extLst>
+              <a:ext uri="{FF2B5EF4-FFF2-40B4-BE49-F238E27FC236}">
+                <a16:creationId xmlns:a16="http://schemas.microsoft.com/office/drawing/2014/main" id="{0D0C7A7C-0CBC-947E-0AC6-EF02933E8151}"/>
+              </a:ext>
+            </a:extLst>
+          </p:cNvPr>
+          <p:cNvCxnSpPr>
+            <a:cxnSpLocks/>
+          </p:cNvCxnSpPr>
+          <p:nvPr/>
+        </p:nvCxnSpPr>
+        <p:spPr>
+          <a:xfrm flipH="1">
+            <a:off x="1755732" y="3098068"/>
+            <a:ext cx="14513" cy="1318615"/>
+          </a:xfrm>
+          <a:prstGeom prst="line">
+            <a:avLst/>
+          </a:prstGeom>
+          <a:ln w="22225">
+            <a:solidFill>
+              <a:schemeClr val="bg2">
+                <a:lumMod val="90000"/>
+              </a:schemeClr>
+            </a:solidFill>
+            <a:prstDash val="dash"/>
+          </a:ln>
+        </p:spPr>
+        <p:style>
+          <a:lnRef idx="1">
+            <a:schemeClr val="accent1"/>
+          </a:lnRef>
+          <a:fillRef idx="0">
+            <a:schemeClr val="accent1"/>
+          </a:fillRef>
+          <a:effectRef idx="0">
+            <a:schemeClr val="accent1"/>
+          </a:effectRef>
+          <a:fontRef idx="minor">
+            <a:schemeClr val="tx1"/>
+          </a:fontRef>
+        </p:style>
+      </p:cxnSp>
+      <p:sp>
+        <p:nvSpPr>
+          <p:cNvPr id="75" name="TextBox 74">
+            <a:extLst>
+              <a:ext uri="{FF2B5EF4-FFF2-40B4-BE49-F238E27FC236}">
+                <a16:creationId xmlns:a16="http://schemas.microsoft.com/office/drawing/2014/main" id="{D30AE12B-753A-2710-D81E-1921F8644A0E}"/>
+              </a:ext>
+            </a:extLst>
+          </p:cNvPr>
+          <p:cNvSpPr txBox="1"/>
+          <p:nvPr/>
+        </p:nvSpPr>
+        <p:spPr>
+          <a:xfrm>
+            <a:off x="534503" y="1551240"/>
+            <a:ext cx="2895088" cy="1600438"/>
+          </a:xfrm>
+          <a:prstGeom prst="rect">
+            <a:avLst/>
+          </a:prstGeom>
+          <a:noFill/>
+        </p:spPr>
+        <p:txBody>
+          <a:bodyPr wrap="none" rtlCol="0">
+            <a:spAutoFit/>
+          </a:bodyPr>
+          <a:lstStyle>
+            <a:defPPr>
+              <a:defRPr lang="en-CN"/>
+            </a:defPPr>
+            <a:lvl1pPr>
+              <a:defRPr sz="1400"/>
+            </a:lvl1pPr>
+          </a:lstStyle>
+          <a:p>
+            <a:r>
+              <a:rPr lang="en-US" b="1" dirty="0"/>
+              <a:t>Random jitter for each ensemble</a:t>
+            </a:r>
+          </a:p>
+          <a:p>
+            <a:endParaRPr lang="en-CN" dirty="0"/>
+          </a:p>
+          <a:p>
+            <a:r>
+              <a:rPr lang="en-CN" dirty="0"/>
+              <a:t>Decided by:</a:t>
+            </a:r>
+          </a:p>
+          <a:p>
+            <a:r>
+              <a:rPr lang="en-US" dirty="0" err="1"/>
+              <a:t>temporal_bin_start_jitter</a:t>
+            </a:r>
+            <a:r>
+              <a:rPr lang="en-US" dirty="0"/>
+              <a:t>="random",</a:t>
+            </a:r>
+          </a:p>
+          <a:p>
+            <a:r>
+              <a:rPr lang="en-US" dirty="0" err="1"/>
+              <a:t>spatio_bin_jitter_magnitude</a:t>
+            </a:r>
+            <a:r>
+              <a:rPr lang="en-US" dirty="0"/>
+              <a:t>=100</a:t>
+            </a:r>
+          </a:p>
+          <a:p>
+            <a:endParaRPr lang="en-US" dirty="0"/>
+          </a:p>
+          <a:p>
+            <a:endParaRPr lang="en-CN" dirty="0"/>
+          </a:p>
+        </p:txBody>
+      </p:sp>
+      <p:sp>
+        <p:nvSpPr>
+          <p:cNvPr id="76" name="TextBox 75">
+            <a:extLst>
+              <a:ext uri="{FF2B5EF4-FFF2-40B4-BE49-F238E27FC236}">
+                <a16:creationId xmlns:a16="http://schemas.microsoft.com/office/drawing/2014/main" id="{6CD9AE0D-F806-1618-D64F-596A06F28960}"/>
+              </a:ext>
+            </a:extLst>
+          </p:cNvPr>
+          <p:cNvSpPr txBox="1"/>
+          <p:nvPr/>
+        </p:nvSpPr>
+        <p:spPr>
+          <a:xfrm>
+            <a:off x="6780726" y="4108360"/>
+            <a:ext cx="343364" cy="369332"/>
+          </a:xfrm>
+          <a:prstGeom prst="rect">
+            <a:avLst/>
+          </a:prstGeom>
+          <a:noFill/>
+        </p:spPr>
+        <p:txBody>
+          <a:bodyPr wrap="none" rtlCol="0">
+            <a:spAutoFit/>
+          </a:bodyPr>
+          <a:lstStyle/>
+          <a:p>
+            <a:r>
+              <a:rPr lang="en-CN" dirty="0"/>
+              <a:t>…</a:t>
+            </a:r>
+          </a:p>
+        </p:txBody>
+      </p:sp>
+    </p:spTree>
+    <p:extLst>
+      <p:ext uri="{BB962C8B-B14F-4D97-AF65-F5344CB8AC3E}">
+        <p14:creationId xmlns:p14="http://schemas.microsoft.com/office/powerpoint/2010/main" val="253638523"/>
+      </p:ext>
+    </p:extLst>
+  </p:cSld>
+  <p:clrMapOvr>
+    <a:masterClrMapping/>
+  </p:clrMapOvr>
+</p:sld>
+</file>
+
+<file path=ppt/slides/slide7.xml><?xml version="1.0" encoding="utf-8"?>
+<p:sld xmlns:a="http://schemas.openxmlformats.org/drawingml/2006/main" xmlns:r="http://schemas.openxmlformats.org/officeDocument/2006/relationships" xmlns:p="http://schemas.openxmlformats.org/presentationml/2006/main">
+  <p:cSld>
+    <p:spTree>
+      <p:nvGrpSpPr>
+        <p:cNvPr id="1" name=""/>
+        <p:cNvGrpSpPr/>
+        <p:nvPr/>
+      </p:nvGrpSpPr>
+      <p:grpSpPr>
+        <a:xfrm>
+          <a:off x="0" y="0"/>
+          <a:ext cx="0" cy="0"/>
+          <a:chOff x="0" y="0"/>
+          <a:chExt cx="0" cy="0"/>
+        </a:xfrm>
+      </p:grpSpPr>
+      <p:sp>
+        <p:nvSpPr>
+          <p:cNvPr id="2" name="Title 1">
+            <a:extLst>
+              <a:ext uri="{FF2B5EF4-FFF2-40B4-BE49-F238E27FC236}">
+                <a16:creationId xmlns:a16="http://schemas.microsoft.com/office/drawing/2014/main" id="{15A03D9A-DC69-4567-D3AE-B4B602E53BB7}"/>
+              </a:ext>
+            </a:extLst>
+          </p:cNvPr>
+          <p:cNvSpPr>
+            <a:spLocks noGrp="1"/>
+          </p:cNvSpPr>
+          <p:nvPr>
+            <p:ph type="title"/>
+          </p:nvPr>
+        </p:nvSpPr>
+        <p:spPr/>
+        <p:txBody>
+          <a:bodyPr/>
+          <a:lstStyle/>
+          <a:p>
+            <a:endParaRPr lang="en-CN"/>
+          </a:p>
+        </p:txBody>
+      </p:sp>
+      <p:sp>
+        <p:nvSpPr>
+          <p:cNvPr id="3" name="Content Placeholder 2">
+            <a:extLst>
+              <a:ext uri="{FF2B5EF4-FFF2-40B4-BE49-F238E27FC236}">
+                <a16:creationId xmlns:a16="http://schemas.microsoft.com/office/drawing/2014/main" id="{17FD8928-CD7A-0E1E-861B-F0BD908EC090}"/>
+              </a:ext>
+            </a:extLst>
+          </p:cNvPr>
+          <p:cNvSpPr>
+            <a:spLocks noGrp="1"/>
+          </p:cNvSpPr>
+          <p:nvPr>
+            <p:ph idx="1"/>
+          </p:nvPr>
+        </p:nvSpPr>
+        <p:spPr/>
+        <p:txBody>
+          <a:bodyPr/>
+          <a:lstStyle/>
+          <a:p>
+            <a:endParaRPr lang="en-CN"/>
+          </a:p>
+        </p:txBody>
+      </p:sp>
+    </p:spTree>
+    <p:extLst>
+      <p:ext uri="{BB962C8B-B14F-4D97-AF65-F5344CB8AC3E}">
+        <p14:creationId xmlns:p14="http://schemas.microsoft.com/office/powerpoint/2010/main" val="2499518020"/>
+      </p:ext>
+    </p:extLst>
+  </p:cSld>
+  <p:clrMapOvr>
+    <a:masterClrMapping/>
+  </p:clrMapOvr>
+</p:sld>
+</file>
+
+<file path=ppt/slides/slide8.xml><?xml version="1.0" encoding="utf-8"?>
+<p:sld xmlns:a="http://schemas.openxmlformats.org/drawingml/2006/main" xmlns:r="http://schemas.openxmlformats.org/officeDocument/2006/relationships" xmlns:p="http://schemas.openxmlformats.org/presentationml/2006/main">
+  <p:cSld>
+    <p:spTree>
+      <p:nvGrpSpPr>
+        <p:cNvPr id="1" name=""/>
+        <p:cNvGrpSpPr/>
+        <p:nvPr/>
+      </p:nvGrpSpPr>
+      <p:grpSpPr>
+        <a:xfrm>
+          <a:off x="0" y="0"/>
+          <a:ext cx="0" cy="0"/>
+          <a:chOff x="0" y="0"/>
+          <a:chExt cx="0" cy="0"/>
+        </a:xfrm>
+      </p:grpSpPr>
+      <p:sp>
+        <p:nvSpPr>
+          <p:cNvPr id="2" name="Title 1">
+            <a:extLst>
+              <a:ext uri="{FF2B5EF4-FFF2-40B4-BE49-F238E27FC236}">
+                <a16:creationId xmlns:a16="http://schemas.microsoft.com/office/drawing/2014/main" id="{15A03D9A-DC69-4567-D3AE-B4B602E53BB7}"/>
+              </a:ext>
+            </a:extLst>
+          </p:cNvPr>
+          <p:cNvSpPr>
+            <a:spLocks noGrp="1"/>
+          </p:cNvSpPr>
+          <p:nvPr>
+            <p:ph type="title"/>
+          </p:nvPr>
+        </p:nvSpPr>
+        <p:spPr/>
+        <p:txBody>
+          <a:bodyPr/>
+          <a:lstStyle/>
+          <a:p>
+            <a:endParaRPr lang="en-CN"/>
+          </a:p>
+        </p:txBody>
+      </p:sp>
+      <p:sp>
+        <p:nvSpPr>
+          <p:cNvPr id="3" name="Content Placeholder 2">
+            <a:extLst>
+              <a:ext uri="{FF2B5EF4-FFF2-40B4-BE49-F238E27FC236}">
+                <a16:creationId xmlns:a16="http://schemas.microsoft.com/office/drawing/2014/main" id="{17FD8928-CD7A-0E1E-861B-F0BD908EC090}"/>
+              </a:ext>
+            </a:extLst>
+          </p:cNvPr>
+          <p:cNvSpPr>
+            <a:spLocks noGrp="1"/>
+          </p:cNvSpPr>
+          <p:nvPr>
+            <p:ph idx="1"/>
+          </p:nvPr>
+        </p:nvSpPr>
+        <p:spPr/>
+        <p:txBody>
+          <a:bodyPr/>
+          <a:lstStyle/>
+          <a:p>
+            <a:endParaRPr lang="en-CN"/>
+          </a:p>
+        </p:txBody>
+      </p:sp>
+    </p:spTree>
+    <p:extLst>
+      <p:ext uri="{BB962C8B-B14F-4D97-AF65-F5344CB8AC3E}">
+        <p14:creationId xmlns:p14="http://schemas.microsoft.com/office/powerpoint/2010/main" val="2776313628"/>
+      </p:ext>
+    </p:extLst>
+  </p:cSld>
+  <p:clrMapOvr>
+    <a:masterClrMapping/>
+  </p:clrMapOvr>
+</p:sld>
+</file>
+
 <file path=ppt/theme/theme1.xml><?xml version="1.0" encoding="utf-8"?>
 <a:theme xmlns:a="http://schemas.openxmlformats.org/drawingml/2006/main" name="Office Theme">
   <a:themeElements>

</xml_diff>